<commit_message>
Revert "Revert "update presentation""
This reverts commit 88c955fb63f4d1ce4f5a0fc47600ac23a9dc1b4c.
</commit_message>
<xml_diff>
--- a/docs/CMPE 320 Final Group Presentation.pptx
+++ b/docs/CMPE 320 Final Group Presentation.pptx
@@ -5,22 +5,21 @@
     <p:sldMasterId id="2147483684" r:id="rId1"/>
   </p:sldMasterIdLst>
   <p:notesMasterIdLst>
-    <p:notesMasterId r:id="rId15"/>
+    <p:notesMasterId r:id="rId14"/>
   </p:notesMasterIdLst>
   <p:sldIdLst>
-    <p:sldId id="256" r:id="rId2"/>
+    <p:sldId id="271" r:id="rId2"/>
     <p:sldId id="269" r:id="rId3"/>
-    <p:sldId id="270" r:id="rId4"/>
+    <p:sldId id="272" r:id="rId4"/>
     <p:sldId id="264" r:id="rId5"/>
     <p:sldId id="258" r:id="rId6"/>
     <p:sldId id="259" r:id="rId7"/>
-    <p:sldId id="260" r:id="rId8"/>
-    <p:sldId id="261" r:id="rId9"/>
-    <p:sldId id="262" r:id="rId10"/>
-    <p:sldId id="263" r:id="rId11"/>
-    <p:sldId id="265" r:id="rId12"/>
-    <p:sldId id="266" r:id="rId13"/>
-    <p:sldId id="268" r:id="rId14"/>
+    <p:sldId id="273" r:id="rId8"/>
+    <p:sldId id="262" r:id="rId9"/>
+    <p:sldId id="263" r:id="rId10"/>
+    <p:sldId id="265" r:id="rId11"/>
+    <p:sldId id="266" r:id="rId12"/>
+    <p:sldId id="268" r:id="rId13"/>
   </p:sldIdLst>
   <p:sldSz cx="12192000" cy="6858000"/>
   <p:notesSz cx="6858000" cy="9144000"/>
@@ -217,7 +216,7 @@
           <a:p>
             <a:fld id="{C4FC6804-2B10-7A4C-8567-7E8DA1DD1FAF}" type="datetimeFigureOut">
               <a:rPr lang="en-US" smtClean="0"/>
-              <a:t>11/21/2019</a:t>
+              <a:t>11/21/19</a:t>
             </a:fld>
             <a:endParaRPr lang="en-US"/>
           </a:p>
@@ -873,7 +872,7 @@
     </p:spTree>
     <p:extLst>
       <p:ext uri="{BB962C8B-B14F-4D97-AF65-F5344CB8AC3E}">
-        <p14:creationId xmlns:p14="http://schemas.microsoft.com/office/powerpoint/2010/main" val="3359629142"/>
+        <p14:creationId xmlns:p14="http://schemas.microsoft.com/office/powerpoint/2010/main" val="1379127382"/>
       </p:ext>
     </p:extLst>
   </p:cSld>
@@ -1305,6 +1304,174 @@
     <p:extLst>
       <p:ext uri="{BB962C8B-B14F-4D97-AF65-F5344CB8AC3E}">
         <p14:creationId xmlns:p14="http://schemas.microsoft.com/office/powerpoint/2010/main" val="1598011070"/>
+      </p:ext>
+    </p:extLst>
+  </p:cSld>
+  <p:clrMapOvr>
+    <a:masterClrMapping/>
+  </p:clrMapOvr>
+</p:notes>
+</file>
+
+<file path=ppt/notesSlides/notesSlide5.xml><?xml version="1.0" encoding="utf-8"?>
+<p:notes xmlns:a="http://schemas.openxmlformats.org/drawingml/2006/main" xmlns:r="http://schemas.openxmlformats.org/officeDocument/2006/relationships" xmlns:p="http://schemas.openxmlformats.org/presentationml/2006/main">
+  <p:cSld>
+    <p:spTree>
+      <p:nvGrpSpPr>
+        <p:cNvPr id="1" name=""/>
+        <p:cNvGrpSpPr/>
+        <p:nvPr/>
+      </p:nvGrpSpPr>
+      <p:grpSpPr>
+        <a:xfrm>
+          <a:off x="0" y="0"/>
+          <a:ext cx="0" cy="0"/>
+          <a:chOff x="0" y="0"/>
+          <a:chExt cx="0" cy="0"/>
+        </a:xfrm>
+      </p:grpSpPr>
+      <p:sp>
+        <p:nvSpPr>
+          <p:cNvPr id="2" name="Slide Image Placeholder 1"/>
+          <p:cNvSpPr>
+            <a:spLocks noGrp="1" noRot="1" noChangeAspect="1"/>
+          </p:cNvSpPr>
+          <p:nvPr>
+            <p:ph type="sldImg"/>
+          </p:nvPr>
+        </p:nvSpPr>
+        <p:spPr/>
+      </p:sp>
+      <p:sp>
+        <p:nvSpPr>
+          <p:cNvPr id="3" name="Notes Placeholder 2"/>
+          <p:cNvSpPr>
+            <a:spLocks noGrp="1"/>
+          </p:cNvSpPr>
+          <p:nvPr>
+            <p:ph type="body" idx="1"/>
+          </p:nvPr>
+        </p:nvSpPr>
+        <p:spPr/>
+        <p:txBody>
+          <a:bodyPr/>
+          <a:lstStyle/>
+          <a:p>
+            <a:endParaRPr lang="en-US" dirty="0"/>
+          </a:p>
+        </p:txBody>
+      </p:sp>
+      <p:sp>
+        <p:nvSpPr>
+          <p:cNvPr id="4" name="Slide Number Placeholder 3"/>
+          <p:cNvSpPr>
+            <a:spLocks noGrp="1"/>
+          </p:cNvSpPr>
+          <p:nvPr>
+            <p:ph type="sldNum" sz="quarter" idx="5"/>
+          </p:nvPr>
+        </p:nvSpPr>
+        <p:spPr/>
+        <p:txBody>
+          <a:bodyPr/>
+          <a:lstStyle/>
+          <a:p>
+            <a:fld id="{E4A74916-00A0-C849-8911-B521A9C8724E}" type="slidenum">
+              <a:rPr lang="en-US" smtClean="0"/>
+              <a:t>8</a:t>
+            </a:fld>
+            <a:endParaRPr lang="en-US"/>
+          </a:p>
+        </p:txBody>
+      </p:sp>
+    </p:spTree>
+    <p:extLst>
+      <p:ext uri="{BB962C8B-B14F-4D97-AF65-F5344CB8AC3E}">
+        <p14:creationId xmlns:p14="http://schemas.microsoft.com/office/powerpoint/2010/main" val="1525417135"/>
+      </p:ext>
+    </p:extLst>
+  </p:cSld>
+  <p:clrMapOvr>
+    <a:masterClrMapping/>
+  </p:clrMapOvr>
+</p:notes>
+</file>
+
+<file path=ppt/notesSlides/notesSlide6.xml><?xml version="1.0" encoding="utf-8"?>
+<p:notes xmlns:a="http://schemas.openxmlformats.org/drawingml/2006/main" xmlns:r="http://schemas.openxmlformats.org/officeDocument/2006/relationships" xmlns:p="http://schemas.openxmlformats.org/presentationml/2006/main">
+  <p:cSld>
+    <p:spTree>
+      <p:nvGrpSpPr>
+        <p:cNvPr id="1" name=""/>
+        <p:cNvGrpSpPr/>
+        <p:nvPr/>
+      </p:nvGrpSpPr>
+      <p:grpSpPr>
+        <a:xfrm>
+          <a:off x="0" y="0"/>
+          <a:ext cx="0" cy="0"/>
+          <a:chOff x="0" y="0"/>
+          <a:chExt cx="0" cy="0"/>
+        </a:xfrm>
+      </p:grpSpPr>
+      <p:sp>
+        <p:nvSpPr>
+          <p:cNvPr id="2" name="Slide Image Placeholder 1"/>
+          <p:cNvSpPr>
+            <a:spLocks noGrp="1" noRot="1" noChangeAspect="1"/>
+          </p:cNvSpPr>
+          <p:nvPr>
+            <p:ph type="sldImg"/>
+          </p:nvPr>
+        </p:nvSpPr>
+        <p:spPr/>
+      </p:sp>
+      <p:sp>
+        <p:nvSpPr>
+          <p:cNvPr id="3" name="Notes Placeholder 2"/>
+          <p:cNvSpPr>
+            <a:spLocks noGrp="1"/>
+          </p:cNvSpPr>
+          <p:nvPr>
+            <p:ph type="body" idx="1"/>
+          </p:nvPr>
+        </p:nvSpPr>
+        <p:spPr/>
+        <p:txBody>
+          <a:bodyPr/>
+          <a:lstStyle/>
+          <a:p>
+            <a:endParaRPr lang="en-US" dirty="0"/>
+          </a:p>
+        </p:txBody>
+      </p:sp>
+      <p:sp>
+        <p:nvSpPr>
+          <p:cNvPr id="4" name="Slide Number Placeholder 3"/>
+          <p:cNvSpPr>
+            <a:spLocks noGrp="1"/>
+          </p:cNvSpPr>
+          <p:nvPr>
+            <p:ph type="sldNum" sz="quarter" idx="5"/>
+          </p:nvPr>
+        </p:nvSpPr>
+        <p:spPr/>
+        <p:txBody>
+          <a:bodyPr/>
+          <a:lstStyle/>
+          <a:p>
+            <a:fld id="{E4A74916-00A0-C849-8911-B521A9C8724E}" type="slidenum">
+              <a:rPr lang="en-US" smtClean="0"/>
+              <a:t>9</a:t>
+            </a:fld>
+            <a:endParaRPr lang="en-US"/>
+          </a:p>
+        </p:txBody>
+      </p:sp>
+    </p:spTree>
+    <p:extLst>
+      <p:ext uri="{BB962C8B-B14F-4D97-AF65-F5344CB8AC3E}">
+        <p14:creationId xmlns:p14="http://schemas.microsoft.com/office/powerpoint/2010/main" val="2343471616"/>
       </p:ext>
     </p:extLst>
   </p:cSld>
@@ -2060,7 +2227,7 @@
             <a:fld id="{08B9EBBA-996F-894A-B54A-D6246ED52CEA}" type="datetimeFigureOut">
               <a:rPr lang="en-US" smtClean="0"/>
               <a:pPr/>
-              <a:t>11/21/2019</a:t>
+              <a:t>11/21/19</a:t>
             </a:fld>
             <a:endParaRPr lang="en-US" dirty="0"/>
           </a:p>
@@ -2313,7 +2480,7 @@
             <a:fld id="{09B482E8-6E0E-1B4F-B1FD-C69DB9E858D9}" type="datetimeFigureOut">
               <a:rPr lang="en-US" smtClean="0"/>
               <a:pPr/>
-              <a:t>11/21/2019</a:t>
+              <a:t>11/21/19</a:t>
             </a:fld>
             <a:endParaRPr lang="en-US" dirty="0"/>
           </a:p>
@@ -2630,7 +2797,7 @@
             <a:fld id="{09B482E8-6E0E-1B4F-B1FD-C69DB9E858D9}" type="datetimeFigureOut">
               <a:rPr lang="en-US" smtClean="0"/>
               <a:pPr/>
-              <a:t>11/21/2019</a:t>
+              <a:t>11/21/19</a:t>
             </a:fld>
             <a:endParaRPr lang="en-US" dirty="0"/>
           </a:p>
@@ -2966,7 +3133,7 @@
             <a:fld id="{09B482E8-6E0E-1B4F-B1FD-C69DB9E858D9}" type="datetimeFigureOut">
               <a:rPr lang="en-US" smtClean="0"/>
               <a:pPr/>
-              <a:t>11/21/2019</a:t>
+              <a:t>11/21/19</a:t>
             </a:fld>
             <a:endParaRPr lang="en-US" dirty="0"/>
           </a:p>
@@ -3283,7 +3450,7 @@
             <a:fld id="{09B482E8-6E0E-1B4F-B1FD-C69DB9E858D9}" type="datetimeFigureOut">
               <a:rPr lang="en-US" smtClean="0"/>
               <a:pPr/>
-              <a:t>11/21/2019</a:t>
+              <a:t>11/21/19</a:t>
             </a:fld>
             <a:endParaRPr lang="en-US" dirty="0"/>
           </a:p>
@@ -3679,7 +3846,7 @@
             <a:fld id="{09B482E8-6E0E-1B4F-B1FD-C69DB9E858D9}" type="datetimeFigureOut">
               <a:rPr lang="en-US" smtClean="0"/>
               <a:pPr/>
-              <a:t>11/21/2019</a:t>
+              <a:t>11/21/19</a:t>
             </a:fld>
             <a:endParaRPr lang="en-US" dirty="0"/>
           </a:p>
@@ -3852,7 +4019,7 @@
             <a:fld id="{C6C52C72-DE31-F449-A4ED-4C594FD91407}" type="datetimeFigureOut">
               <a:rPr lang="en-US" smtClean="0"/>
               <a:pPr/>
-              <a:t>11/21/2019</a:t>
+              <a:t>11/21/19</a:t>
             </a:fld>
             <a:endParaRPr lang="en-US" dirty="0"/>
           </a:p>
@@ -4034,7 +4201,7 @@
             <a:fld id="{ED62726E-379B-B349-9EED-81ED093FA806}" type="datetimeFigureOut">
               <a:rPr lang="en-US" smtClean="0"/>
               <a:pPr/>
-              <a:t>11/21/2019</a:t>
+              <a:t>11/21/19</a:t>
             </a:fld>
             <a:endParaRPr lang="en-US" dirty="0"/>
           </a:p>
@@ -4206,7 +4373,7 @@
             <a:fld id="{9B3A1323-8D79-1946-B0D7-40001CF92E9D}" type="datetimeFigureOut">
               <a:rPr lang="en-US" smtClean="0"/>
               <a:pPr/>
-              <a:t>11/21/2019</a:t>
+              <a:t>11/21/19</a:t>
             </a:fld>
             <a:endParaRPr lang="en-US" dirty="0"/>
           </a:p>
@@ -4455,7 +4622,7 @@
             <a:fld id="{8DFA1846-DA80-1C48-A609-854EA85C59AD}" type="datetimeFigureOut">
               <a:rPr lang="en-US" smtClean="0"/>
               <a:pPr/>
-              <a:t>11/21/2019</a:t>
+              <a:t>11/21/19</a:t>
             </a:fld>
             <a:endParaRPr lang="en-US" dirty="0"/>
           </a:p>
@@ -4689,7 +4856,7 @@
             <a:fld id="{57302355-E14B-8545-A8F8-0FE83CC9D524}" type="datetimeFigureOut">
               <a:rPr lang="en-US" smtClean="0"/>
               <a:pPr/>
-              <a:t>11/21/2019</a:t>
+              <a:t>11/21/19</a:t>
             </a:fld>
             <a:endParaRPr lang="en-US" dirty="0"/>
           </a:p>
@@ -5065,7 +5232,7 @@
             <a:fld id="{02640F58-564D-2B4F-AE67-E407BA4FCF45}" type="datetimeFigureOut">
               <a:rPr lang="en-US" smtClean="0"/>
               <a:pPr/>
-              <a:t>11/21/2019</a:t>
+              <a:t>11/21/19</a:t>
             </a:fld>
             <a:endParaRPr lang="en-US" dirty="0"/>
           </a:p>
@@ -5190,7 +5357,7 @@
             <a:fld id="{F13A34C8-038E-2045-AF43-DF7DBB8E0E9E}" type="datetimeFigureOut">
               <a:rPr lang="en-US" smtClean="0"/>
               <a:pPr/>
-              <a:t>11/21/2019</a:t>
+              <a:t>11/21/19</a:t>
             </a:fld>
             <a:endParaRPr lang="en-US" dirty="0"/>
           </a:p>
@@ -5287,7 +5454,7 @@
             <a:fld id="{8818C68F-D26B-8F47-958C-23B49CF8A634}" type="datetimeFigureOut">
               <a:rPr lang="en-US" smtClean="0"/>
               <a:pPr/>
-              <a:t>11/21/2019</a:t>
+              <a:t>11/21/19</a:t>
             </a:fld>
             <a:endParaRPr lang="en-US" dirty="0"/>
           </a:p>
@@ -5544,7 +5711,7 @@
             <a:fld id="{D0DF5E60-9974-AC48-9591-99C2BB44B7CF}" type="datetimeFigureOut">
               <a:rPr lang="en-US" smtClean="0"/>
               <a:pPr/>
-              <a:t>11/21/2019</a:t>
+              <a:t>11/21/19</a:t>
             </a:fld>
             <a:endParaRPr lang="en-US" dirty="0"/>
           </a:p>
@@ -5852,7 +6019,7 @@
             <a:fld id="{09B482E8-6E0E-1B4F-B1FD-C69DB9E858D9}" type="datetimeFigureOut">
               <a:rPr lang="en-US" smtClean="0"/>
               <a:pPr/>
-              <a:t>11/21/2019</a:t>
+              <a:t>11/21/19</a:t>
             </a:fld>
             <a:endParaRPr lang="en-US" dirty="0"/>
           </a:p>
@@ -6556,7 +6723,7 @@
             <a:fld id="{09B482E8-6E0E-1B4F-B1FD-C69DB9E858D9}" type="datetimeFigureOut">
               <a:rPr lang="en-US" smtClean="0"/>
               <a:pPr/>
-              <a:t>11/21/2019</a:t>
+              <a:t>11/21/19</a:t>
             </a:fld>
             <a:endParaRPr lang="en-US" dirty="0"/>
           </a:p>
@@ -7104,9 +7271,17 @@
           <a:lstStyle/>
           <a:p>
             <a:r>
+              <a:rPr lang="en-US" sz="6600" dirty="0"/>
+              <a:t>Crash!</a:t>
+            </a:r>
+            <a:br>
               <a:rPr lang="en-US" dirty="0"/>
+            </a:br>
+            <a:r>
+              <a:rPr lang="en-US" sz="3600" dirty="0"/>
               <a:t>Stock Simulation Game</a:t>
             </a:r>
+            <a:endParaRPr lang="en-US" dirty="0"/>
           </a:p>
         </p:txBody>
       </p:sp>
@@ -7440,7 +7615,7 @@
     </p:spTree>
     <p:extLst>
       <p:ext uri="{BB962C8B-B14F-4D97-AF65-F5344CB8AC3E}">
-        <p14:creationId xmlns:p14="http://schemas.microsoft.com/office/powerpoint/2010/main" val="1467564254"/>
+        <p14:creationId xmlns:p14="http://schemas.microsoft.com/office/powerpoint/2010/main" val="816844263"/>
       </p:ext>
     </p:extLst>
   </p:cSld>
@@ -7472,7 +7647,7 @@
           <p:cNvPr id="2" name="Title 1">
             <a:extLst>
               <a:ext uri="{FF2B5EF4-FFF2-40B4-BE49-F238E27FC236}">
-                <a16:creationId xmlns:a16="http://schemas.microsoft.com/office/drawing/2014/main" id="{0B8510EA-80A4-A142-8E01-B079CE29C39A}"/>
+                <a16:creationId xmlns:a16="http://schemas.microsoft.com/office/drawing/2014/main" id="{F815B958-F430-284F-937B-4428EDC07691}"/>
               </a:ext>
             </a:extLst>
           </p:cNvPr>
@@ -7490,17 +7665,17 @@
           <a:p>
             <a:r>
               <a:rPr lang="en-US" dirty="0"/>
-              <a:t>Work in Progress</a:t>
-            </a:r>
-          </a:p>
-        </p:txBody>
-      </p:sp>
-      <p:sp>
-        <p:nvSpPr>
-          <p:cNvPr id="4" name="Content Placeholder 2">
+              <a:t>Improvements for Future Projects</a:t>
+            </a:r>
+          </a:p>
+        </p:txBody>
+      </p:sp>
+      <p:sp>
+        <p:nvSpPr>
+          <p:cNvPr id="3" name="Content Placeholder 2">
             <a:extLst>
               <a:ext uri="{FF2B5EF4-FFF2-40B4-BE49-F238E27FC236}">
-                <a16:creationId xmlns:a16="http://schemas.microsoft.com/office/drawing/2014/main" id="{402E3166-D3FF-904F-B026-8092268B2346}"/>
+                <a16:creationId xmlns:a16="http://schemas.microsoft.com/office/drawing/2014/main" id="{10E9FD41-C25C-A84B-A800-C418B543406F}"/>
               </a:ext>
             </a:extLst>
           </p:cNvPr>
@@ -7508,633 +7683,43 @@
             <a:spLocks noGrp="1"/>
           </p:cNvSpPr>
           <p:nvPr>
-            <p:ph sz="half" idx="1"/>
-          </p:nvPr>
-        </p:nvSpPr>
-        <p:spPr>
-          <a:xfrm>
-            <a:off x="677335" y="2160589"/>
-            <a:ext cx="2909928" cy="3880772"/>
-          </a:xfrm>
-        </p:spPr>
+            <p:ph idx="1"/>
+          </p:nvPr>
+        </p:nvSpPr>
+        <p:spPr/>
         <p:txBody>
           <a:bodyPr/>
           <a:lstStyle/>
           <a:p>
-            <a:pPr marL="0" indent="0">
-              <a:buNone/>
-            </a:pPr>
-            <a:r>
-              <a:rPr lang="en-US" b="1" dirty="0"/>
-              <a:t>Front-End Sub-Team</a:t>
-            </a:r>
-          </a:p>
-          <a:p>
-            <a:r>
-              <a:rPr lang="en-US" sz="1600" dirty="0"/>
-              <a:t>Back-end integration</a:t>
-            </a:r>
-          </a:p>
-          <a:p>
-            <a:r>
-              <a:rPr lang="en-US" sz="1600" dirty="0"/>
-              <a:t>Button functionality integration with game logic</a:t>
-            </a:r>
-          </a:p>
-          <a:p>
-            <a:endParaRPr lang="en-US" sz="1600" dirty="0"/>
-          </a:p>
-        </p:txBody>
-      </p:sp>
-      <p:sp>
-        <p:nvSpPr>
-          <p:cNvPr id="5" name="Content Placeholder 2">
-            <a:extLst>
-              <a:ext uri="{FF2B5EF4-FFF2-40B4-BE49-F238E27FC236}">
-                <a16:creationId xmlns:a16="http://schemas.microsoft.com/office/drawing/2014/main" id="{CEDBD428-65E5-EC45-B822-18CC650DBF30}"/>
-              </a:ext>
-            </a:extLst>
-          </p:cNvPr>
-          <p:cNvSpPr txBox="1">
-            <a:spLocks/>
-          </p:cNvSpPr>
-          <p:nvPr/>
-        </p:nvSpPr>
-        <p:spPr>
-          <a:xfrm>
-            <a:off x="3520704" y="2168821"/>
-            <a:ext cx="2909928" cy="3880772"/>
-          </a:xfrm>
-          <a:prstGeom prst="rect">
-            <a:avLst/>
-          </a:prstGeom>
-        </p:spPr>
-        <p:txBody>
-          <a:bodyPr vert="horz" lIns="91440" tIns="45720" rIns="91440" bIns="45720" rtlCol="0">
-            <a:normAutofit/>
-          </a:bodyPr>
-          <a:lstStyle>
-            <a:lvl1pPr marL="342900" indent="-342900" algn="l" defTabSz="457200" rtl="0" eaLnBrk="1" latinLnBrk="0" hangingPunct="1">
-              <a:spcBef>
-                <a:spcPts val="1000"/>
-              </a:spcBef>
-              <a:spcAft>
-                <a:spcPts val="0"/>
-              </a:spcAft>
-              <a:buClr>
-                <a:schemeClr val="accent1"/>
-              </a:buClr>
-              <a:buSzPct val="80000"/>
-              <a:buFont typeface="Wingdings 3" charset="2"/>
-              <a:buChar char=""/>
-              <a:defRPr sz="1800" kern="1200">
-                <a:solidFill>
-                  <a:schemeClr val="tx1">
-                    <a:lumMod val="75000"/>
-                    <a:lumOff val="25000"/>
-                  </a:schemeClr>
-                </a:solidFill>
-                <a:latin typeface="+mn-lt"/>
-                <a:ea typeface="+mn-ea"/>
-                <a:cs typeface="+mn-cs"/>
-              </a:defRPr>
-            </a:lvl1pPr>
-            <a:lvl2pPr marL="742950" indent="-285750" algn="l" defTabSz="457200" rtl="0" eaLnBrk="1" latinLnBrk="0" hangingPunct="1">
-              <a:spcBef>
-                <a:spcPts val="1000"/>
-              </a:spcBef>
-              <a:spcAft>
-                <a:spcPts val="0"/>
-              </a:spcAft>
-              <a:buClr>
-                <a:schemeClr val="accent1"/>
-              </a:buClr>
-              <a:buSzPct val="80000"/>
-              <a:buFont typeface="Wingdings 3" charset="2"/>
-              <a:buChar char=""/>
-              <a:defRPr sz="1600" kern="1200">
-                <a:solidFill>
-                  <a:schemeClr val="tx1">
-                    <a:lumMod val="75000"/>
-                    <a:lumOff val="25000"/>
-                  </a:schemeClr>
-                </a:solidFill>
-                <a:latin typeface="+mn-lt"/>
-                <a:ea typeface="+mn-ea"/>
-                <a:cs typeface="+mn-cs"/>
-              </a:defRPr>
-            </a:lvl2pPr>
-            <a:lvl3pPr marL="1143000" indent="-228600" algn="l" defTabSz="457200" rtl="0" eaLnBrk="1" latinLnBrk="0" hangingPunct="1">
-              <a:spcBef>
-                <a:spcPts val="1000"/>
-              </a:spcBef>
-              <a:spcAft>
-                <a:spcPts val="0"/>
-              </a:spcAft>
-              <a:buClr>
-                <a:schemeClr val="accent1"/>
-              </a:buClr>
-              <a:buSzPct val="80000"/>
-              <a:buFont typeface="Wingdings 3" charset="2"/>
-              <a:buChar char=""/>
-              <a:defRPr sz="1400" kern="1200">
-                <a:solidFill>
-                  <a:schemeClr val="tx1">
-                    <a:lumMod val="75000"/>
-                    <a:lumOff val="25000"/>
-                  </a:schemeClr>
-                </a:solidFill>
-                <a:latin typeface="+mn-lt"/>
-                <a:ea typeface="+mn-ea"/>
-                <a:cs typeface="+mn-cs"/>
-              </a:defRPr>
-            </a:lvl3pPr>
-            <a:lvl4pPr marL="1600200" indent="-228600" algn="l" defTabSz="457200" rtl="0" eaLnBrk="1" latinLnBrk="0" hangingPunct="1">
-              <a:spcBef>
-                <a:spcPts val="1000"/>
-              </a:spcBef>
-              <a:spcAft>
-                <a:spcPts val="0"/>
-              </a:spcAft>
-              <a:buClr>
-                <a:schemeClr val="accent1"/>
-              </a:buClr>
-              <a:buSzPct val="80000"/>
-              <a:buFont typeface="Wingdings 3" charset="2"/>
-              <a:buChar char=""/>
-              <a:defRPr sz="1200" kern="1200">
-                <a:solidFill>
-                  <a:schemeClr val="tx1">
-                    <a:lumMod val="75000"/>
-                    <a:lumOff val="25000"/>
-                  </a:schemeClr>
-                </a:solidFill>
-                <a:latin typeface="+mn-lt"/>
-                <a:ea typeface="+mn-ea"/>
-                <a:cs typeface="+mn-cs"/>
-              </a:defRPr>
-            </a:lvl4pPr>
-            <a:lvl5pPr marL="2057400" indent="-228600" algn="l" defTabSz="457200" rtl="0" eaLnBrk="1" latinLnBrk="0" hangingPunct="1">
-              <a:spcBef>
-                <a:spcPts val="1000"/>
-              </a:spcBef>
-              <a:spcAft>
-                <a:spcPts val="0"/>
-              </a:spcAft>
-              <a:buClr>
-                <a:schemeClr val="accent1"/>
-              </a:buClr>
-              <a:buSzPct val="80000"/>
-              <a:buFont typeface="Wingdings 3" charset="2"/>
-              <a:buChar char=""/>
-              <a:defRPr sz="1200" kern="1200">
-                <a:solidFill>
-                  <a:schemeClr val="tx1">
-                    <a:lumMod val="75000"/>
-                    <a:lumOff val="25000"/>
-                  </a:schemeClr>
-                </a:solidFill>
-                <a:latin typeface="+mn-lt"/>
-                <a:ea typeface="+mn-ea"/>
-                <a:cs typeface="+mn-cs"/>
-              </a:defRPr>
-            </a:lvl5pPr>
-            <a:lvl6pPr marL="2514600" indent="-228600" algn="l" defTabSz="457200" rtl="0" eaLnBrk="1" latinLnBrk="0" hangingPunct="1">
-              <a:spcBef>
-                <a:spcPts val="1000"/>
-              </a:spcBef>
-              <a:spcAft>
-                <a:spcPts val="0"/>
-              </a:spcAft>
-              <a:buClr>
-                <a:schemeClr val="accent1"/>
-              </a:buClr>
-              <a:buSzPct val="80000"/>
-              <a:buFont typeface="Wingdings 3" charset="2"/>
-              <a:buChar char=""/>
-              <a:defRPr sz="1200" kern="1200">
-                <a:solidFill>
-                  <a:schemeClr val="tx1">
-                    <a:lumMod val="75000"/>
-                    <a:lumOff val="25000"/>
-                  </a:schemeClr>
-                </a:solidFill>
-                <a:latin typeface="+mn-lt"/>
-                <a:ea typeface="+mn-ea"/>
-                <a:cs typeface="+mn-cs"/>
-              </a:defRPr>
-            </a:lvl6pPr>
-            <a:lvl7pPr marL="2971800" indent="-228600" algn="l" defTabSz="457200" rtl="0" eaLnBrk="1" latinLnBrk="0" hangingPunct="1">
-              <a:spcBef>
-                <a:spcPts val="1000"/>
-              </a:spcBef>
-              <a:spcAft>
-                <a:spcPts val="0"/>
-              </a:spcAft>
-              <a:buClr>
-                <a:schemeClr val="accent1"/>
-              </a:buClr>
-              <a:buSzPct val="80000"/>
-              <a:buFont typeface="Wingdings 3" charset="2"/>
-              <a:buChar char=""/>
-              <a:defRPr sz="1200" kern="1200">
-                <a:solidFill>
-                  <a:schemeClr val="tx1">
-                    <a:lumMod val="75000"/>
-                    <a:lumOff val="25000"/>
-                  </a:schemeClr>
-                </a:solidFill>
-                <a:latin typeface="+mn-lt"/>
-                <a:ea typeface="+mn-ea"/>
-                <a:cs typeface="+mn-cs"/>
-              </a:defRPr>
-            </a:lvl7pPr>
-            <a:lvl8pPr marL="3429000" indent="-228600" algn="l" defTabSz="457200" rtl="0" eaLnBrk="1" latinLnBrk="0" hangingPunct="1">
-              <a:spcBef>
-                <a:spcPts val="1000"/>
-              </a:spcBef>
-              <a:spcAft>
-                <a:spcPts val="0"/>
-              </a:spcAft>
-              <a:buClr>
-                <a:schemeClr val="accent1"/>
-              </a:buClr>
-              <a:buSzPct val="80000"/>
-              <a:buFont typeface="Wingdings 3" charset="2"/>
-              <a:buChar char=""/>
-              <a:defRPr sz="1200" kern="1200">
-                <a:solidFill>
-                  <a:schemeClr val="tx1">
-                    <a:lumMod val="75000"/>
-                    <a:lumOff val="25000"/>
-                  </a:schemeClr>
-                </a:solidFill>
-                <a:latin typeface="+mn-lt"/>
-                <a:ea typeface="+mn-ea"/>
-                <a:cs typeface="+mn-cs"/>
-              </a:defRPr>
-            </a:lvl8pPr>
-            <a:lvl9pPr marL="3886200" indent="-228600" algn="l" defTabSz="457200" rtl="0" eaLnBrk="1" latinLnBrk="0" hangingPunct="1">
-              <a:spcBef>
-                <a:spcPts val="1000"/>
-              </a:spcBef>
-              <a:spcAft>
-                <a:spcPts val="0"/>
-              </a:spcAft>
-              <a:buClr>
-                <a:schemeClr val="accent1"/>
-              </a:buClr>
-              <a:buSzPct val="80000"/>
-              <a:buFont typeface="Wingdings 3" charset="2"/>
-              <a:buChar char=""/>
-              <a:defRPr sz="1200" kern="1200">
-                <a:solidFill>
-                  <a:schemeClr val="tx1">
-                    <a:lumMod val="75000"/>
-                    <a:lumOff val="25000"/>
-                  </a:schemeClr>
-                </a:solidFill>
-                <a:latin typeface="+mn-lt"/>
-                <a:ea typeface="+mn-ea"/>
-                <a:cs typeface="+mn-cs"/>
-              </a:defRPr>
-            </a:lvl9pPr>
-          </a:lstStyle>
-          <a:p>
-            <a:pPr marL="0" indent="0">
-              <a:buNone/>
-            </a:pPr>
-            <a:r>
-              <a:rPr lang="en-US" b="1" dirty="0"/>
-              <a:t>Back-End Sub-Team</a:t>
-            </a:r>
-          </a:p>
-          <a:p>
-            <a:r>
-              <a:rPr lang="en-US" sz="1600" dirty="0"/>
-              <a:t>He</a:t>
-            </a:r>
-          </a:p>
-          <a:p>
-            <a:r>
-              <a:rPr lang="en-US" sz="1600" dirty="0"/>
-              <a:t>lo</a:t>
-            </a:r>
-          </a:p>
-        </p:txBody>
-      </p:sp>
-      <p:sp>
-        <p:nvSpPr>
-          <p:cNvPr id="6" name="Content Placeholder 2">
-            <a:extLst>
-              <a:ext uri="{FF2B5EF4-FFF2-40B4-BE49-F238E27FC236}">
-                <a16:creationId xmlns:a16="http://schemas.microsoft.com/office/drawing/2014/main" id="{ABFA7731-22EF-2946-AFDC-E09B0D18A463}"/>
-              </a:ext>
-            </a:extLst>
-          </p:cNvPr>
-          <p:cNvSpPr txBox="1">
-            <a:spLocks/>
-          </p:cNvSpPr>
-          <p:nvPr/>
-        </p:nvSpPr>
-        <p:spPr>
-          <a:xfrm>
-            <a:off x="6236676" y="2177053"/>
-            <a:ext cx="3793589" cy="3880772"/>
-          </a:xfrm>
-          <a:prstGeom prst="rect">
-            <a:avLst/>
-          </a:prstGeom>
-        </p:spPr>
-        <p:txBody>
-          <a:bodyPr vert="horz" lIns="91440" tIns="45720" rIns="91440" bIns="45720" rtlCol="0">
-            <a:normAutofit/>
-          </a:bodyPr>
-          <a:lstStyle>
-            <a:lvl1pPr marL="342900" indent="-342900" algn="l" defTabSz="457200" rtl="0" eaLnBrk="1" latinLnBrk="0" hangingPunct="1">
-              <a:spcBef>
-                <a:spcPts val="1000"/>
-              </a:spcBef>
-              <a:spcAft>
-                <a:spcPts val="0"/>
-              </a:spcAft>
-              <a:buClr>
-                <a:schemeClr val="accent1"/>
-              </a:buClr>
-              <a:buSzPct val="80000"/>
-              <a:buFont typeface="Wingdings 3" charset="2"/>
-              <a:buChar char=""/>
-              <a:defRPr sz="1800" kern="1200">
-                <a:solidFill>
-                  <a:schemeClr val="tx1">
-                    <a:lumMod val="75000"/>
-                    <a:lumOff val="25000"/>
-                  </a:schemeClr>
-                </a:solidFill>
-                <a:latin typeface="+mn-lt"/>
-                <a:ea typeface="+mn-ea"/>
-                <a:cs typeface="+mn-cs"/>
-              </a:defRPr>
-            </a:lvl1pPr>
-            <a:lvl2pPr marL="742950" indent="-285750" algn="l" defTabSz="457200" rtl="0" eaLnBrk="1" latinLnBrk="0" hangingPunct="1">
-              <a:spcBef>
-                <a:spcPts val="1000"/>
-              </a:spcBef>
-              <a:spcAft>
-                <a:spcPts val="0"/>
-              </a:spcAft>
-              <a:buClr>
-                <a:schemeClr val="accent1"/>
-              </a:buClr>
-              <a:buSzPct val="80000"/>
-              <a:buFont typeface="Wingdings 3" charset="2"/>
-              <a:buChar char=""/>
-              <a:defRPr sz="1600" kern="1200">
-                <a:solidFill>
-                  <a:schemeClr val="tx1">
-                    <a:lumMod val="75000"/>
-                    <a:lumOff val="25000"/>
-                  </a:schemeClr>
-                </a:solidFill>
-                <a:latin typeface="+mn-lt"/>
-                <a:ea typeface="+mn-ea"/>
-                <a:cs typeface="+mn-cs"/>
-              </a:defRPr>
-            </a:lvl2pPr>
-            <a:lvl3pPr marL="1143000" indent="-228600" algn="l" defTabSz="457200" rtl="0" eaLnBrk="1" latinLnBrk="0" hangingPunct="1">
-              <a:spcBef>
-                <a:spcPts val="1000"/>
-              </a:spcBef>
-              <a:spcAft>
-                <a:spcPts val="0"/>
-              </a:spcAft>
-              <a:buClr>
-                <a:schemeClr val="accent1"/>
-              </a:buClr>
-              <a:buSzPct val="80000"/>
-              <a:buFont typeface="Wingdings 3" charset="2"/>
-              <a:buChar char=""/>
-              <a:defRPr sz="1400" kern="1200">
-                <a:solidFill>
-                  <a:schemeClr val="tx1">
-                    <a:lumMod val="75000"/>
-                    <a:lumOff val="25000"/>
-                  </a:schemeClr>
-                </a:solidFill>
-                <a:latin typeface="+mn-lt"/>
-                <a:ea typeface="+mn-ea"/>
-                <a:cs typeface="+mn-cs"/>
-              </a:defRPr>
-            </a:lvl3pPr>
-            <a:lvl4pPr marL="1600200" indent="-228600" algn="l" defTabSz="457200" rtl="0" eaLnBrk="1" latinLnBrk="0" hangingPunct="1">
-              <a:spcBef>
-                <a:spcPts val="1000"/>
-              </a:spcBef>
-              <a:spcAft>
-                <a:spcPts val="0"/>
-              </a:spcAft>
-              <a:buClr>
-                <a:schemeClr val="accent1"/>
-              </a:buClr>
-              <a:buSzPct val="80000"/>
-              <a:buFont typeface="Wingdings 3" charset="2"/>
-              <a:buChar char=""/>
-              <a:defRPr sz="1200" kern="1200">
-                <a:solidFill>
-                  <a:schemeClr val="tx1">
-                    <a:lumMod val="75000"/>
-                    <a:lumOff val="25000"/>
-                  </a:schemeClr>
-                </a:solidFill>
-                <a:latin typeface="+mn-lt"/>
-                <a:ea typeface="+mn-ea"/>
-                <a:cs typeface="+mn-cs"/>
-              </a:defRPr>
-            </a:lvl4pPr>
-            <a:lvl5pPr marL="2057400" indent="-228600" algn="l" defTabSz="457200" rtl="0" eaLnBrk="1" latinLnBrk="0" hangingPunct="1">
-              <a:spcBef>
-                <a:spcPts val="1000"/>
-              </a:spcBef>
-              <a:spcAft>
-                <a:spcPts val="0"/>
-              </a:spcAft>
-              <a:buClr>
-                <a:schemeClr val="accent1"/>
-              </a:buClr>
-              <a:buSzPct val="80000"/>
-              <a:buFont typeface="Wingdings 3" charset="2"/>
-              <a:buChar char=""/>
-              <a:defRPr sz="1200" kern="1200">
-                <a:solidFill>
-                  <a:schemeClr val="tx1">
-                    <a:lumMod val="75000"/>
-                    <a:lumOff val="25000"/>
-                  </a:schemeClr>
-                </a:solidFill>
-                <a:latin typeface="+mn-lt"/>
-                <a:ea typeface="+mn-ea"/>
-                <a:cs typeface="+mn-cs"/>
-              </a:defRPr>
-            </a:lvl5pPr>
-            <a:lvl6pPr marL="2514600" indent="-228600" algn="l" defTabSz="457200" rtl="0" eaLnBrk="1" latinLnBrk="0" hangingPunct="1">
-              <a:spcBef>
-                <a:spcPts val="1000"/>
-              </a:spcBef>
-              <a:spcAft>
-                <a:spcPts val="0"/>
-              </a:spcAft>
-              <a:buClr>
-                <a:schemeClr val="accent1"/>
-              </a:buClr>
-              <a:buSzPct val="80000"/>
-              <a:buFont typeface="Wingdings 3" charset="2"/>
-              <a:buChar char=""/>
-              <a:defRPr sz="1200" kern="1200">
-                <a:solidFill>
-                  <a:schemeClr val="tx1">
-                    <a:lumMod val="75000"/>
-                    <a:lumOff val="25000"/>
-                  </a:schemeClr>
-                </a:solidFill>
-                <a:latin typeface="+mn-lt"/>
-                <a:ea typeface="+mn-ea"/>
-                <a:cs typeface="+mn-cs"/>
-              </a:defRPr>
-            </a:lvl6pPr>
-            <a:lvl7pPr marL="2971800" indent="-228600" algn="l" defTabSz="457200" rtl="0" eaLnBrk="1" latinLnBrk="0" hangingPunct="1">
-              <a:spcBef>
-                <a:spcPts val="1000"/>
-              </a:spcBef>
-              <a:spcAft>
-                <a:spcPts val="0"/>
-              </a:spcAft>
-              <a:buClr>
-                <a:schemeClr val="accent1"/>
-              </a:buClr>
-              <a:buSzPct val="80000"/>
-              <a:buFont typeface="Wingdings 3" charset="2"/>
-              <a:buChar char=""/>
-              <a:defRPr sz="1200" kern="1200">
-                <a:solidFill>
-                  <a:schemeClr val="tx1">
-                    <a:lumMod val="75000"/>
-                    <a:lumOff val="25000"/>
-                  </a:schemeClr>
-                </a:solidFill>
-                <a:latin typeface="+mn-lt"/>
-                <a:ea typeface="+mn-ea"/>
-                <a:cs typeface="+mn-cs"/>
-              </a:defRPr>
-            </a:lvl7pPr>
-            <a:lvl8pPr marL="3429000" indent="-228600" algn="l" defTabSz="457200" rtl="0" eaLnBrk="1" latinLnBrk="0" hangingPunct="1">
-              <a:spcBef>
-                <a:spcPts val="1000"/>
-              </a:spcBef>
-              <a:spcAft>
-                <a:spcPts val="0"/>
-              </a:spcAft>
-              <a:buClr>
-                <a:schemeClr val="accent1"/>
-              </a:buClr>
-              <a:buSzPct val="80000"/>
-              <a:buFont typeface="Wingdings 3" charset="2"/>
-              <a:buChar char=""/>
-              <a:defRPr sz="1200" kern="1200">
-                <a:solidFill>
-                  <a:schemeClr val="tx1">
-                    <a:lumMod val="75000"/>
-                    <a:lumOff val="25000"/>
-                  </a:schemeClr>
-                </a:solidFill>
-                <a:latin typeface="+mn-lt"/>
-                <a:ea typeface="+mn-ea"/>
-                <a:cs typeface="+mn-cs"/>
-              </a:defRPr>
-            </a:lvl8pPr>
-            <a:lvl9pPr marL="3886200" indent="-228600" algn="l" defTabSz="457200" rtl="0" eaLnBrk="1" latinLnBrk="0" hangingPunct="1">
-              <a:spcBef>
-                <a:spcPts val="1000"/>
-              </a:spcBef>
-              <a:spcAft>
-                <a:spcPts val="0"/>
-              </a:spcAft>
-              <a:buClr>
-                <a:schemeClr val="accent1"/>
-              </a:buClr>
-              <a:buSzPct val="80000"/>
-              <a:buFont typeface="Wingdings 3" charset="2"/>
-              <a:buChar char=""/>
-              <a:defRPr sz="1200" kern="1200">
-                <a:solidFill>
-                  <a:schemeClr val="tx1">
-                    <a:lumMod val="75000"/>
-                    <a:lumOff val="25000"/>
-                  </a:schemeClr>
-                </a:solidFill>
-                <a:latin typeface="+mn-lt"/>
-                <a:ea typeface="+mn-ea"/>
-                <a:cs typeface="+mn-cs"/>
-              </a:defRPr>
-            </a:lvl9pPr>
-          </a:lstStyle>
-          <a:p>
-            <a:pPr marL="0" indent="0">
-              <a:buNone/>
-            </a:pPr>
-            <a:r>
-              <a:rPr lang="en-US" b="1" dirty="0"/>
-              <a:t>Game Functionality Sub-Team</a:t>
-            </a:r>
-          </a:p>
-          <a:p>
-            <a:r>
-              <a:rPr lang="en-US" sz="1600" dirty="0"/>
-              <a:t>Solidify game security</a:t>
-            </a:r>
-          </a:p>
-          <a:p>
-            <a:r>
-              <a:rPr lang="en-US" sz="1600" dirty="0"/>
-              <a:t>Implement new game logic for additional features</a:t>
-            </a:r>
-          </a:p>
-          <a:p>
-            <a:pPr lvl="1"/>
-            <a:r>
-              <a:rPr lang="en-US" sz="1400" dirty="0"/>
-              <a:t>Buy out functionality</a:t>
-            </a:r>
-          </a:p>
-          <a:p>
-            <a:pPr lvl="1"/>
-            <a:r>
-              <a:rPr lang="en-US" sz="1400" dirty="0"/>
-              <a:t>Log out functionality</a:t>
-            </a:r>
-          </a:p>
-          <a:p>
-            <a:pPr lvl="1"/>
-            <a:r>
-              <a:rPr lang="en-US" sz="1400" dirty="0"/>
-              <a:t>Winning conditions</a:t>
-            </a:r>
-          </a:p>
-          <a:p>
-            <a:pPr lvl="1"/>
-            <a:r>
-              <a:rPr lang="en-US" sz="1400" dirty="0"/>
-              <a:t>Per round fee</a:t>
-            </a:r>
-          </a:p>
-          <a:p>
-            <a:endParaRPr lang="en-US" dirty="0"/>
+            <a:r>
+              <a:rPr lang="en-US" dirty="0"/>
+              <a:t>Creation of Game Logic Flowchart at beginning of semester</a:t>
+            </a:r>
+          </a:p>
+          <a:p>
+            <a:r>
+              <a:rPr lang="en-US" dirty="0"/>
+              <a:t>Use alternate IDE for front-end from the start</a:t>
+            </a:r>
+          </a:p>
+          <a:p>
+            <a:r>
+              <a:rPr lang="en-US" dirty="0"/>
+              <a:t>Improved team wide communication </a:t>
+            </a:r>
+          </a:p>
+          <a:p>
+            <a:r>
+              <a:rPr lang="en-US" dirty="0"/>
+              <a:t>Improved communication with TA</a:t>
+            </a:r>
           </a:p>
         </p:txBody>
       </p:sp>
     </p:spTree>
     <p:extLst>
       <p:ext uri="{BB962C8B-B14F-4D97-AF65-F5344CB8AC3E}">
-        <p14:creationId xmlns:p14="http://schemas.microsoft.com/office/powerpoint/2010/main" val="430596845"/>
+        <p14:creationId xmlns:p14="http://schemas.microsoft.com/office/powerpoint/2010/main" val="3146250260"/>
       </p:ext>
     </p:extLst>
   </p:cSld>
@@ -8163,110 +7748,6 @@
       </p:grpSpPr>
       <p:sp>
         <p:nvSpPr>
-          <p:cNvPr id="2" name="Title 1">
-            <a:extLst>
-              <a:ext uri="{FF2B5EF4-FFF2-40B4-BE49-F238E27FC236}">
-                <a16:creationId xmlns:a16="http://schemas.microsoft.com/office/drawing/2014/main" id="{F815B958-F430-284F-937B-4428EDC07691}"/>
-              </a:ext>
-            </a:extLst>
-          </p:cNvPr>
-          <p:cNvSpPr>
-            <a:spLocks noGrp="1"/>
-          </p:cNvSpPr>
-          <p:nvPr>
-            <p:ph type="title"/>
-          </p:nvPr>
-        </p:nvSpPr>
-        <p:spPr/>
-        <p:txBody>
-          <a:bodyPr/>
-          <a:lstStyle/>
-          <a:p>
-            <a:r>
-              <a:rPr lang="en-US" dirty="0"/>
-              <a:t>Improvements for Future Projects</a:t>
-            </a:r>
-          </a:p>
-        </p:txBody>
-      </p:sp>
-      <p:sp>
-        <p:nvSpPr>
-          <p:cNvPr id="3" name="Content Placeholder 2">
-            <a:extLst>
-              <a:ext uri="{FF2B5EF4-FFF2-40B4-BE49-F238E27FC236}">
-                <a16:creationId xmlns:a16="http://schemas.microsoft.com/office/drawing/2014/main" id="{10E9FD41-C25C-A84B-A800-C418B543406F}"/>
-              </a:ext>
-            </a:extLst>
-          </p:cNvPr>
-          <p:cNvSpPr>
-            <a:spLocks noGrp="1"/>
-          </p:cNvSpPr>
-          <p:nvPr>
-            <p:ph idx="1"/>
-          </p:nvPr>
-        </p:nvSpPr>
-        <p:spPr/>
-        <p:txBody>
-          <a:bodyPr/>
-          <a:lstStyle/>
-          <a:p>
-            <a:r>
-              <a:rPr lang="en-US" dirty="0"/>
-              <a:t>Creation of Game Logic Flowchart at beginning of semester</a:t>
-            </a:r>
-          </a:p>
-          <a:p>
-            <a:r>
-              <a:rPr lang="en-US" dirty="0"/>
-              <a:t>Use alternate IDE for front-end due to Qt library issue</a:t>
-            </a:r>
-          </a:p>
-          <a:p>
-            <a:r>
-              <a:rPr lang="en-US" dirty="0"/>
-              <a:t>Improved team wide communication </a:t>
-            </a:r>
-          </a:p>
-          <a:p>
-            <a:r>
-              <a:rPr lang="en-US" dirty="0"/>
-              <a:t>Improved communication with TA</a:t>
-            </a:r>
-          </a:p>
-        </p:txBody>
-      </p:sp>
-    </p:spTree>
-    <p:extLst>
-      <p:ext uri="{BB962C8B-B14F-4D97-AF65-F5344CB8AC3E}">
-        <p14:creationId xmlns:p14="http://schemas.microsoft.com/office/powerpoint/2010/main" val="3146250260"/>
-      </p:ext>
-    </p:extLst>
-  </p:cSld>
-  <p:clrMapOvr>
-    <a:masterClrMapping/>
-  </p:clrMapOvr>
-</p:sld>
-</file>
-
-<file path=ppt/slides/slide12.xml><?xml version="1.0" encoding="utf-8"?>
-<p:sld xmlns:a="http://schemas.openxmlformats.org/drawingml/2006/main" xmlns:r="http://schemas.openxmlformats.org/officeDocument/2006/relationships" xmlns:p="http://schemas.openxmlformats.org/presentationml/2006/main">
-  <p:cSld>
-    <p:spTree>
-      <p:nvGrpSpPr>
-        <p:cNvPr id="1" name=""/>
-        <p:cNvGrpSpPr/>
-        <p:nvPr/>
-      </p:nvGrpSpPr>
-      <p:grpSpPr>
-        <a:xfrm>
-          <a:off x="0" y="0"/>
-          <a:ext cx="0" cy="0"/>
-          <a:chOff x="0" y="0"/>
-          <a:chExt cx="0" cy="0"/>
-        </a:xfrm>
-      </p:grpSpPr>
-      <p:sp>
-        <p:nvSpPr>
           <p:cNvPr id="4" name="Title 3">
             <a:extLst>
               <a:ext uri="{FF2B5EF4-FFF2-40B4-BE49-F238E27FC236}">
@@ -8306,7 +7787,7 @@
 </p:sld>
 </file>
 
-<file path=ppt/slides/slide13.xml><?xml version="1.0" encoding="utf-8"?>
+<file path=ppt/slides/slide12.xml><?xml version="1.0" encoding="utf-8"?>
 <p:sld xmlns:a="http://schemas.openxmlformats.org/drawingml/2006/main" xmlns:r="http://schemas.openxmlformats.org/officeDocument/2006/relationships" xmlns:p="http://schemas.openxmlformats.org/presentationml/2006/main">
   <p:cSld>
     <p:spTree>
@@ -8439,7 +7920,7 @@
             <a:pPr lvl="1"/>
             <a:r>
               <a:rPr lang="en-US" dirty="0"/>
-              <a:t>Race against other users to maximize capital whilst not going bankrupt or getting bought out</a:t>
+              <a:t>Race against other users to maximize capital whilst not going bankrupt</a:t>
             </a:r>
           </a:p>
           <a:p>
@@ -8513,51 +7994,24 @@
             <a:spLocks noGrp="1"/>
           </p:cNvSpPr>
           <p:nvPr>
-            <p:ph type="title"/>
-          </p:nvPr>
-        </p:nvSpPr>
-        <p:spPr/>
-        <p:txBody>
-          <a:bodyPr/>
+            <p:ph type="ctrTitle"/>
+          </p:nvPr>
+        </p:nvSpPr>
+        <p:spPr>
+          <a:xfrm>
+            <a:off x="677335" y="1282701"/>
+            <a:ext cx="5096060" cy="4307148"/>
+          </a:xfrm>
+        </p:spPr>
+        <p:txBody>
+          <a:bodyPr anchor="ctr">
+            <a:normAutofit/>
+          </a:bodyPr>
           <a:lstStyle/>
           <a:p>
             <a:r>
               <a:rPr lang="en-US" dirty="0"/>
               <a:t>Demonstration</a:t>
-            </a:r>
-          </a:p>
-        </p:txBody>
-      </p:sp>
-      <p:sp>
-        <p:nvSpPr>
-          <p:cNvPr id="3" name="Content Placeholder 2">
-            <a:extLst>
-              <a:ext uri="{FF2B5EF4-FFF2-40B4-BE49-F238E27FC236}">
-                <a16:creationId xmlns:a16="http://schemas.microsoft.com/office/drawing/2014/main" id="{449EEBB3-55F2-2348-B2DF-2647E55601D8}"/>
-              </a:ext>
-            </a:extLst>
-          </p:cNvPr>
-          <p:cNvSpPr>
-            <a:spLocks noGrp="1"/>
-          </p:cNvSpPr>
-          <p:nvPr>
-            <p:ph idx="1"/>
-          </p:nvPr>
-        </p:nvSpPr>
-        <p:spPr/>
-        <p:txBody>
-          <a:bodyPr/>
-          <a:lstStyle/>
-          <a:p>
-            <a:r>
-              <a:rPr lang="en-US" dirty="0"/>
-              <a:t>**include screenshot of GUI here**</a:t>
-            </a:r>
-          </a:p>
-          <a:p>
-            <a:r>
-              <a:rPr lang="en-US" dirty="0"/>
-              <a:t>Exit to demonstration??</a:t>
             </a:r>
           </a:p>
         </p:txBody>
@@ -8565,7 +8019,7 @@
     </p:spTree>
     <p:extLst>
       <p:ext uri="{BB962C8B-B14F-4D97-AF65-F5344CB8AC3E}">
-        <p14:creationId xmlns:p14="http://schemas.microsoft.com/office/powerpoint/2010/main" val="1011367267"/>
+        <p14:creationId xmlns:p14="http://schemas.microsoft.com/office/powerpoint/2010/main" val="897546376"/>
       </p:ext>
     </p:extLst>
   </p:cSld>
@@ -9645,16 +9099,6 @@
               <a:rPr lang="en-US" sz="1400" dirty="0"/>
               <a:t>Logic of how players interact with the interface</a:t>
             </a:r>
-          </a:p>
-          <a:p>
-            <a:pPr lvl="1"/>
-            <a:r>
-              <a:rPr lang="en-US" sz="1400" dirty="0"/>
-              <a:t>Logic of how players interact with each other</a:t>
-            </a:r>
-          </a:p>
-          <a:p>
-            <a:endParaRPr lang="en-US" dirty="0"/>
           </a:p>
         </p:txBody>
       </p:sp>
@@ -10562,7 +10006,7 @@
           <a:p>
             <a:r>
               <a:rPr lang="en-US" dirty="0"/>
-              <a:t>Challenges Overcome</a:t>
+              <a:t>Challenges</a:t>
             </a:r>
           </a:p>
         </p:txBody>
@@ -10638,7 +10082,7 @@
         </p:nvSpPr>
         <p:spPr>
           <a:xfrm>
-            <a:off x="3520704" y="2168821"/>
+            <a:off x="3326748" y="2165942"/>
             <a:ext cx="2909928" cy="3880772"/>
           </a:xfrm>
           <a:prstGeom prst="rect">
@@ -10888,14 +10332,63 @@
           <a:p>
             <a:r>
               <a:rPr lang="en-US" sz="1600" dirty="0"/>
-              <a:t>He</a:t>
-            </a:r>
+              <a:t>Security issues on the client-side</a:t>
+            </a:r>
+          </a:p>
+          <a:p>
+            <a:pPr lvl="1"/>
+            <a:r>
+              <a:rPr lang="en-US" sz="1400" dirty="0"/>
+              <a:t>Client could hack the game &amp; cheat</a:t>
+            </a:r>
+            <a:endParaRPr lang="en-US" sz="1600" dirty="0"/>
           </a:p>
           <a:p>
             <a:r>
               <a:rPr lang="en-US" sz="1600" dirty="0"/>
-              <a:t>lo</a:t>
-            </a:r>
+              <a:t>Have server run on Windows system	</a:t>
+            </a:r>
+          </a:p>
+          <a:p>
+            <a:pPr lvl="1"/>
+            <a:r>
+              <a:rPr lang="en-US" sz="1400" dirty="0"/>
+              <a:t>Switched to </a:t>
+            </a:r>
+            <a:r>
+              <a:rPr lang="en-US" sz="1400" dirty="0" err="1"/>
+              <a:t>linux</a:t>
+            </a:r>
+            <a:r>
+              <a:rPr lang="en-US" sz="1400" dirty="0"/>
+              <a:t> system</a:t>
+            </a:r>
+          </a:p>
+          <a:p>
+            <a:r>
+              <a:rPr lang="en-US" sz="1600" dirty="0"/>
+              <a:t>Initial usage of web server for back-end</a:t>
+            </a:r>
+          </a:p>
+          <a:p>
+            <a:pPr lvl="1"/>
+            <a:r>
+              <a:rPr lang="en-US" sz="1400" dirty="0"/>
+              <a:t>Require HTTP request</a:t>
+            </a:r>
+          </a:p>
+          <a:p>
+            <a:pPr lvl="1"/>
+            <a:r>
+              <a:rPr lang="en-US" sz="1400" dirty="0"/>
+              <a:t>Switched to sockets</a:t>
+            </a:r>
+          </a:p>
+          <a:p>
+            <a:pPr marL="457200" lvl="1" indent="0">
+              <a:buNone/>
+            </a:pPr>
+            <a:endParaRPr lang="en-US" sz="1400" dirty="0"/>
           </a:p>
         </p:txBody>
       </p:sp>
@@ -11188,7 +10681,7 @@
     </p:spTree>
     <p:extLst>
       <p:ext uri="{BB962C8B-B14F-4D97-AF65-F5344CB8AC3E}">
-        <p14:creationId xmlns:p14="http://schemas.microsoft.com/office/powerpoint/2010/main" val="3072174952"/>
+        <p14:creationId xmlns:p14="http://schemas.microsoft.com/office/powerpoint/2010/main" val="78488871"/>
       </p:ext>
     </p:extLst>
   </p:cSld>
@@ -11201,6 +10694,14 @@
 <file path=ppt/slides/slide8.xml><?xml version="1.0" encoding="utf-8"?>
 <p:sld xmlns:a="http://schemas.openxmlformats.org/drawingml/2006/main" xmlns:r="http://schemas.openxmlformats.org/officeDocument/2006/relationships" xmlns:p="http://schemas.openxmlformats.org/presentationml/2006/main">
   <p:cSld>
+    <p:bg>
+      <p:bgPr>
+        <a:solidFill>
+          <a:schemeClr val="bg1"/>
+        </a:solidFill>
+        <a:effectLst/>
+      </p:bgPr>
+    </p:bg>
     <p:spTree>
       <p:nvGrpSpPr>
         <p:cNvPr id="1" name=""/>
@@ -11220,7 +10721,7 @@
           <p:cNvPr id="2" name="Title 1">
             <a:extLst>
               <a:ext uri="{FF2B5EF4-FFF2-40B4-BE49-F238E27FC236}">
-                <a16:creationId xmlns:a16="http://schemas.microsoft.com/office/drawing/2014/main" id="{8171B732-FAED-2E42-9CEF-7E91F21E47B9}"/>
+                <a16:creationId xmlns:a16="http://schemas.microsoft.com/office/drawing/2014/main" id="{22C1C253-565C-FE40-80D7-B4AC4F44A2F6}"/>
               </a:ext>
             </a:extLst>
           </p:cNvPr>
@@ -11228,860 +10729,130 @@
             <a:spLocks noGrp="1"/>
           </p:cNvSpPr>
           <p:nvPr>
-            <p:ph type="title"/>
-          </p:nvPr>
-        </p:nvSpPr>
-        <p:spPr/>
-        <p:txBody>
-          <a:bodyPr/>
+            <p:ph type="ctrTitle"/>
+          </p:nvPr>
+        </p:nvSpPr>
+        <p:spPr>
+          <a:xfrm>
+            <a:off x="4974337" y="1265314"/>
+            <a:ext cx="4890880" cy="3249131"/>
+          </a:xfrm>
+        </p:spPr>
+        <p:txBody>
+          <a:bodyPr>
+            <a:normAutofit/>
+          </a:bodyPr>
           <a:lstStyle/>
           <a:p>
+            <a:pPr algn="l"/>
             <a:r>
               <a:rPr lang="en-US" dirty="0"/>
-              <a:t>Active Difficulties</a:t>
-            </a:r>
-          </a:p>
-        </p:txBody>
-      </p:sp>
-      <p:sp>
-        <p:nvSpPr>
-          <p:cNvPr id="11" name="Content Placeholder 2">
+              <a:t>Library Usage</a:t>
+            </a:r>
+          </a:p>
+        </p:txBody>
+      </p:sp>
+      <p:sp>
+        <p:nvSpPr>
+          <p:cNvPr id="11" name="Isosceles Triangle 10">
             <a:extLst>
               <a:ext uri="{FF2B5EF4-FFF2-40B4-BE49-F238E27FC236}">
-                <a16:creationId xmlns:a16="http://schemas.microsoft.com/office/drawing/2014/main" id="{5CD39C7C-6174-A541-8571-C1EAC6FBFE81}"/>
+                <a16:creationId xmlns:a16="http://schemas.microsoft.com/office/drawing/2014/main" id="{DC99427B-A97E-40A3-B1FD-4557346C6A91}"/>
+              </a:ext>
+              <a:ext uri="{C183D7F6-B498-43B3-948B-1728B52AA6E4}">
+                <adec:decorative xmlns:adec="http://schemas.microsoft.com/office/drawing/2017/decorative" val="1"/>
               </a:ext>
             </a:extLst>
           </p:cNvPr>
-          <p:cNvSpPr txBox="1">
-            <a:spLocks/>
-          </p:cNvSpPr>
+          <p:cNvSpPr>
+            <a:spLocks noGrp="1" noRot="1" noChangeAspect="1" noMove="1" noResize="1" noEditPoints="1" noAdjustHandles="1" noChangeArrowheads="1" noChangeShapeType="1" noTextEdit="1"/>
+          </p:cNvSpPr>
+          <p:nvPr>
+            <p:extLst>
+              <p:ext uri="{386F3935-93C4-4BCD-93E2-E3B085C9AB24}">
+                <p16:designElem xmlns:p16="http://schemas.microsoft.com/office/powerpoint/2015/main" val="1"/>
+              </p:ext>
+            </p:extLst>
+          </p:nvPr>
+        </p:nvSpPr>
+        <p:spPr>
+          <a:xfrm rot="10800000">
+            <a:off x="3174" y="12700"/>
+            <a:ext cx="842596" cy="5666154"/>
+          </a:xfrm>
+          <a:prstGeom prst="triangle">
+            <a:avLst>
+              <a:gd name="adj" fmla="val 100000"/>
+            </a:avLst>
+          </a:prstGeom>
+          <a:solidFill>
+            <a:schemeClr val="accent1">
+              <a:alpha val="85000"/>
+            </a:schemeClr>
+          </a:solidFill>
+          <a:ln>
+            <a:noFill/>
+          </a:ln>
+          <a:effectLst/>
+        </p:spPr>
+        <p:style>
+          <a:lnRef idx="1">
+            <a:schemeClr val="accent1"/>
+          </a:lnRef>
+          <a:fillRef idx="3">
+            <a:schemeClr val="accent1"/>
+          </a:fillRef>
+          <a:effectRef idx="2">
+            <a:schemeClr val="accent1"/>
+          </a:effectRef>
+          <a:fontRef idx="minor">
+            <a:schemeClr val="lt1"/>
+          </a:fontRef>
+        </p:style>
+      </p:sp>
+      <p:pic>
+        <p:nvPicPr>
+          <p:cNvPr id="8" name="Graphic 7" descr="Books">
+            <a:extLst>
+              <a:ext uri="{FF2B5EF4-FFF2-40B4-BE49-F238E27FC236}">
+                <a16:creationId xmlns:a16="http://schemas.microsoft.com/office/drawing/2014/main" id="{28DD637B-07D0-4CAF-81EC-2E1DF8014900}"/>
+              </a:ext>
+            </a:extLst>
+          </p:cNvPr>
+          <p:cNvPicPr>
+            <a:picLocks noChangeAspect="1"/>
+          </p:cNvPicPr>
           <p:nvPr/>
-        </p:nvSpPr>
+        </p:nvPicPr>
+        <p:blipFill>
+          <a:blip r:embed="rId3">
+            <a:extLst>
+              <a:ext uri="{28A0092B-C50C-407E-A947-70E740481C1C}">
+                <a14:useLocalDpi xmlns:a14="http://schemas.microsoft.com/office/drawing/2010/main" val="0"/>
+              </a:ext>
+              <a:ext uri="{96DAC541-7B7A-43D3-8B79-37D633B846F1}">
+                <asvg:svgBlip xmlns:asvg="http://schemas.microsoft.com/office/drawing/2016/SVG/main" r:embed="rId4"/>
+              </a:ext>
+            </a:extLst>
+          </a:blip>
+          <a:stretch>
+            <a:fillRect/>
+          </a:stretch>
+        </p:blipFill>
         <p:spPr>
           <a:xfrm>
-            <a:off x="677335" y="2160589"/>
-            <a:ext cx="2909928" cy="3880772"/>
+            <a:off x="888604" y="1550139"/>
+            <a:ext cx="3765692" cy="3765692"/>
           </a:xfrm>
           <a:prstGeom prst="rect">
             <a:avLst/>
           </a:prstGeom>
         </p:spPr>
-        <p:txBody>
-          <a:bodyPr vert="horz" lIns="91440" tIns="45720" rIns="91440" bIns="45720" rtlCol="0">
-            <a:normAutofit/>
-          </a:bodyPr>
-          <a:lstStyle>
-            <a:lvl1pPr marL="342900" indent="-342900" algn="l" defTabSz="457200" rtl="0" eaLnBrk="1" latinLnBrk="0" hangingPunct="1">
-              <a:spcBef>
-                <a:spcPts val="1000"/>
-              </a:spcBef>
-              <a:spcAft>
-                <a:spcPts val="0"/>
-              </a:spcAft>
-              <a:buClr>
-                <a:schemeClr val="accent1"/>
-              </a:buClr>
-              <a:buSzPct val="80000"/>
-              <a:buFont typeface="Wingdings 3" charset="2"/>
-              <a:buChar char=""/>
-              <a:defRPr sz="1800" kern="1200">
-                <a:solidFill>
-                  <a:schemeClr val="tx1">
-                    <a:lumMod val="75000"/>
-                    <a:lumOff val="25000"/>
-                  </a:schemeClr>
-                </a:solidFill>
-                <a:latin typeface="+mn-lt"/>
-                <a:ea typeface="+mn-ea"/>
-                <a:cs typeface="+mn-cs"/>
-              </a:defRPr>
-            </a:lvl1pPr>
-            <a:lvl2pPr marL="742950" indent="-285750" algn="l" defTabSz="457200" rtl="0" eaLnBrk="1" latinLnBrk="0" hangingPunct="1">
-              <a:spcBef>
-                <a:spcPts val="1000"/>
-              </a:spcBef>
-              <a:spcAft>
-                <a:spcPts val="0"/>
-              </a:spcAft>
-              <a:buClr>
-                <a:schemeClr val="accent1"/>
-              </a:buClr>
-              <a:buSzPct val="80000"/>
-              <a:buFont typeface="Wingdings 3" charset="2"/>
-              <a:buChar char=""/>
-              <a:defRPr sz="1600" kern="1200">
-                <a:solidFill>
-                  <a:schemeClr val="tx1">
-                    <a:lumMod val="75000"/>
-                    <a:lumOff val="25000"/>
-                  </a:schemeClr>
-                </a:solidFill>
-                <a:latin typeface="+mn-lt"/>
-                <a:ea typeface="+mn-ea"/>
-                <a:cs typeface="+mn-cs"/>
-              </a:defRPr>
-            </a:lvl2pPr>
-            <a:lvl3pPr marL="1143000" indent="-228600" algn="l" defTabSz="457200" rtl="0" eaLnBrk="1" latinLnBrk="0" hangingPunct="1">
-              <a:spcBef>
-                <a:spcPts val="1000"/>
-              </a:spcBef>
-              <a:spcAft>
-                <a:spcPts val="0"/>
-              </a:spcAft>
-              <a:buClr>
-                <a:schemeClr val="accent1"/>
-              </a:buClr>
-              <a:buSzPct val="80000"/>
-              <a:buFont typeface="Wingdings 3" charset="2"/>
-              <a:buChar char=""/>
-              <a:defRPr sz="1400" kern="1200">
-                <a:solidFill>
-                  <a:schemeClr val="tx1">
-                    <a:lumMod val="75000"/>
-                    <a:lumOff val="25000"/>
-                  </a:schemeClr>
-                </a:solidFill>
-                <a:latin typeface="+mn-lt"/>
-                <a:ea typeface="+mn-ea"/>
-                <a:cs typeface="+mn-cs"/>
-              </a:defRPr>
-            </a:lvl3pPr>
-            <a:lvl4pPr marL="1600200" indent="-228600" algn="l" defTabSz="457200" rtl="0" eaLnBrk="1" latinLnBrk="0" hangingPunct="1">
-              <a:spcBef>
-                <a:spcPts val="1000"/>
-              </a:spcBef>
-              <a:spcAft>
-                <a:spcPts val="0"/>
-              </a:spcAft>
-              <a:buClr>
-                <a:schemeClr val="accent1"/>
-              </a:buClr>
-              <a:buSzPct val="80000"/>
-              <a:buFont typeface="Wingdings 3" charset="2"/>
-              <a:buChar char=""/>
-              <a:defRPr sz="1200" kern="1200">
-                <a:solidFill>
-                  <a:schemeClr val="tx1">
-                    <a:lumMod val="75000"/>
-                    <a:lumOff val="25000"/>
-                  </a:schemeClr>
-                </a:solidFill>
-                <a:latin typeface="+mn-lt"/>
-                <a:ea typeface="+mn-ea"/>
-                <a:cs typeface="+mn-cs"/>
-              </a:defRPr>
-            </a:lvl4pPr>
-            <a:lvl5pPr marL="2057400" indent="-228600" algn="l" defTabSz="457200" rtl="0" eaLnBrk="1" latinLnBrk="0" hangingPunct="1">
-              <a:spcBef>
-                <a:spcPts val="1000"/>
-              </a:spcBef>
-              <a:spcAft>
-                <a:spcPts val="0"/>
-              </a:spcAft>
-              <a:buClr>
-                <a:schemeClr val="accent1"/>
-              </a:buClr>
-              <a:buSzPct val="80000"/>
-              <a:buFont typeface="Wingdings 3" charset="2"/>
-              <a:buChar char=""/>
-              <a:defRPr sz="1200" kern="1200">
-                <a:solidFill>
-                  <a:schemeClr val="tx1">
-                    <a:lumMod val="75000"/>
-                    <a:lumOff val="25000"/>
-                  </a:schemeClr>
-                </a:solidFill>
-                <a:latin typeface="+mn-lt"/>
-                <a:ea typeface="+mn-ea"/>
-                <a:cs typeface="+mn-cs"/>
-              </a:defRPr>
-            </a:lvl5pPr>
-            <a:lvl6pPr marL="2514600" indent="-228600" algn="l" defTabSz="457200" rtl="0" eaLnBrk="1" latinLnBrk="0" hangingPunct="1">
-              <a:spcBef>
-                <a:spcPts val="1000"/>
-              </a:spcBef>
-              <a:spcAft>
-                <a:spcPts val="0"/>
-              </a:spcAft>
-              <a:buClr>
-                <a:schemeClr val="accent1"/>
-              </a:buClr>
-              <a:buSzPct val="80000"/>
-              <a:buFont typeface="Wingdings 3" charset="2"/>
-              <a:buChar char=""/>
-              <a:defRPr sz="1200" kern="1200">
-                <a:solidFill>
-                  <a:schemeClr val="tx1">
-                    <a:lumMod val="75000"/>
-                    <a:lumOff val="25000"/>
-                  </a:schemeClr>
-                </a:solidFill>
-                <a:latin typeface="+mn-lt"/>
-                <a:ea typeface="+mn-ea"/>
-                <a:cs typeface="+mn-cs"/>
-              </a:defRPr>
-            </a:lvl6pPr>
-            <a:lvl7pPr marL="2971800" indent="-228600" algn="l" defTabSz="457200" rtl="0" eaLnBrk="1" latinLnBrk="0" hangingPunct="1">
-              <a:spcBef>
-                <a:spcPts val="1000"/>
-              </a:spcBef>
-              <a:spcAft>
-                <a:spcPts val="0"/>
-              </a:spcAft>
-              <a:buClr>
-                <a:schemeClr val="accent1"/>
-              </a:buClr>
-              <a:buSzPct val="80000"/>
-              <a:buFont typeface="Wingdings 3" charset="2"/>
-              <a:buChar char=""/>
-              <a:defRPr sz="1200" kern="1200">
-                <a:solidFill>
-                  <a:schemeClr val="tx1">
-                    <a:lumMod val="75000"/>
-                    <a:lumOff val="25000"/>
-                  </a:schemeClr>
-                </a:solidFill>
-                <a:latin typeface="+mn-lt"/>
-                <a:ea typeface="+mn-ea"/>
-                <a:cs typeface="+mn-cs"/>
-              </a:defRPr>
-            </a:lvl7pPr>
-            <a:lvl8pPr marL="3429000" indent="-228600" algn="l" defTabSz="457200" rtl="0" eaLnBrk="1" latinLnBrk="0" hangingPunct="1">
-              <a:spcBef>
-                <a:spcPts val="1000"/>
-              </a:spcBef>
-              <a:spcAft>
-                <a:spcPts val="0"/>
-              </a:spcAft>
-              <a:buClr>
-                <a:schemeClr val="accent1"/>
-              </a:buClr>
-              <a:buSzPct val="80000"/>
-              <a:buFont typeface="Wingdings 3" charset="2"/>
-              <a:buChar char=""/>
-              <a:defRPr sz="1200" kern="1200">
-                <a:solidFill>
-                  <a:schemeClr val="tx1">
-                    <a:lumMod val="75000"/>
-                    <a:lumOff val="25000"/>
-                  </a:schemeClr>
-                </a:solidFill>
-                <a:latin typeface="+mn-lt"/>
-                <a:ea typeface="+mn-ea"/>
-                <a:cs typeface="+mn-cs"/>
-              </a:defRPr>
-            </a:lvl8pPr>
-            <a:lvl9pPr marL="3886200" indent="-228600" algn="l" defTabSz="457200" rtl="0" eaLnBrk="1" latinLnBrk="0" hangingPunct="1">
-              <a:spcBef>
-                <a:spcPts val="1000"/>
-              </a:spcBef>
-              <a:spcAft>
-                <a:spcPts val="0"/>
-              </a:spcAft>
-              <a:buClr>
-                <a:schemeClr val="accent1"/>
-              </a:buClr>
-              <a:buSzPct val="80000"/>
-              <a:buFont typeface="Wingdings 3" charset="2"/>
-              <a:buChar char=""/>
-              <a:defRPr sz="1200" kern="1200">
-                <a:solidFill>
-                  <a:schemeClr val="tx1">
-                    <a:lumMod val="75000"/>
-                    <a:lumOff val="25000"/>
-                  </a:schemeClr>
-                </a:solidFill>
-                <a:latin typeface="+mn-lt"/>
-                <a:ea typeface="+mn-ea"/>
-                <a:cs typeface="+mn-cs"/>
-              </a:defRPr>
-            </a:lvl9pPr>
-          </a:lstStyle>
-          <a:p>
-            <a:pPr marL="0" indent="0">
-              <a:buFont typeface="Wingdings 3" charset="2"/>
-              <a:buNone/>
-            </a:pPr>
-            <a:r>
-              <a:rPr lang="en-US" b="1" dirty="0"/>
-              <a:t>Front-End Sub-Team</a:t>
-            </a:r>
-          </a:p>
-          <a:p>
-            <a:r>
-              <a:rPr lang="en-US" sz="1600" dirty="0"/>
-              <a:t>Creating a working chat box for users to interact during the simulation</a:t>
-            </a:r>
-          </a:p>
-        </p:txBody>
-      </p:sp>
-      <p:sp>
-        <p:nvSpPr>
-          <p:cNvPr id="12" name="Content Placeholder 2">
-            <a:extLst>
-              <a:ext uri="{FF2B5EF4-FFF2-40B4-BE49-F238E27FC236}">
-                <a16:creationId xmlns:a16="http://schemas.microsoft.com/office/drawing/2014/main" id="{68AAB067-258F-CD4F-BE53-EA1A575E7B01}"/>
-              </a:ext>
-            </a:extLst>
-          </p:cNvPr>
-          <p:cNvSpPr txBox="1">
-            <a:spLocks/>
-          </p:cNvSpPr>
-          <p:nvPr/>
-        </p:nvSpPr>
-        <p:spPr>
-          <a:xfrm>
-            <a:off x="3520704" y="2168821"/>
-            <a:ext cx="2909928" cy="3880772"/>
-          </a:xfrm>
-          <a:prstGeom prst="rect">
-            <a:avLst/>
-          </a:prstGeom>
-        </p:spPr>
-        <p:txBody>
-          <a:bodyPr vert="horz" lIns="91440" tIns="45720" rIns="91440" bIns="45720" rtlCol="0">
-            <a:normAutofit/>
-          </a:bodyPr>
-          <a:lstStyle>
-            <a:lvl1pPr marL="342900" indent="-342900" algn="l" defTabSz="457200" rtl="0" eaLnBrk="1" latinLnBrk="0" hangingPunct="1">
-              <a:spcBef>
-                <a:spcPts val="1000"/>
-              </a:spcBef>
-              <a:spcAft>
-                <a:spcPts val="0"/>
-              </a:spcAft>
-              <a:buClr>
-                <a:schemeClr val="accent1"/>
-              </a:buClr>
-              <a:buSzPct val="80000"/>
-              <a:buFont typeface="Wingdings 3" charset="2"/>
-              <a:buChar char=""/>
-              <a:defRPr sz="1800" kern="1200">
-                <a:solidFill>
-                  <a:schemeClr val="tx1">
-                    <a:lumMod val="75000"/>
-                    <a:lumOff val="25000"/>
-                  </a:schemeClr>
-                </a:solidFill>
-                <a:latin typeface="+mn-lt"/>
-                <a:ea typeface="+mn-ea"/>
-                <a:cs typeface="+mn-cs"/>
-              </a:defRPr>
-            </a:lvl1pPr>
-            <a:lvl2pPr marL="742950" indent="-285750" algn="l" defTabSz="457200" rtl="0" eaLnBrk="1" latinLnBrk="0" hangingPunct="1">
-              <a:spcBef>
-                <a:spcPts val="1000"/>
-              </a:spcBef>
-              <a:spcAft>
-                <a:spcPts val="0"/>
-              </a:spcAft>
-              <a:buClr>
-                <a:schemeClr val="accent1"/>
-              </a:buClr>
-              <a:buSzPct val="80000"/>
-              <a:buFont typeface="Wingdings 3" charset="2"/>
-              <a:buChar char=""/>
-              <a:defRPr sz="1600" kern="1200">
-                <a:solidFill>
-                  <a:schemeClr val="tx1">
-                    <a:lumMod val="75000"/>
-                    <a:lumOff val="25000"/>
-                  </a:schemeClr>
-                </a:solidFill>
-                <a:latin typeface="+mn-lt"/>
-                <a:ea typeface="+mn-ea"/>
-                <a:cs typeface="+mn-cs"/>
-              </a:defRPr>
-            </a:lvl2pPr>
-            <a:lvl3pPr marL="1143000" indent="-228600" algn="l" defTabSz="457200" rtl="0" eaLnBrk="1" latinLnBrk="0" hangingPunct="1">
-              <a:spcBef>
-                <a:spcPts val="1000"/>
-              </a:spcBef>
-              <a:spcAft>
-                <a:spcPts val="0"/>
-              </a:spcAft>
-              <a:buClr>
-                <a:schemeClr val="accent1"/>
-              </a:buClr>
-              <a:buSzPct val="80000"/>
-              <a:buFont typeface="Wingdings 3" charset="2"/>
-              <a:buChar char=""/>
-              <a:defRPr sz="1400" kern="1200">
-                <a:solidFill>
-                  <a:schemeClr val="tx1">
-                    <a:lumMod val="75000"/>
-                    <a:lumOff val="25000"/>
-                  </a:schemeClr>
-                </a:solidFill>
-                <a:latin typeface="+mn-lt"/>
-                <a:ea typeface="+mn-ea"/>
-                <a:cs typeface="+mn-cs"/>
-              </a:defRPr>
-            </a:lvl3pPr>
-            <a:lvl4pPr marL="1600200" indent="-228600" algn="l" defTabSz="457200" rtl="0" eaLnBrk="1" latinLnBrk="0" hangingPunct="1">
-              <a:spcBef>
-                <a:spcPts val="1000"/>
-              </a:spcBef>
-              <a:spcAft>
-                <a:spcPts val="0"/>
-              </a:spcAft>
-              <a:buClr>
-                <a:schemeClr val="accent1"/>
-              </a:buClr>
-              <a:buSzPct val="80000"/>
-              <a:buFont typeface="Wingdings 3" charset="2"/>
-              <a:buChar char=""/>
-              <a:defRPr sz="1200" kern="1200">
-                <a:solidFill>
-                  <a:schemeClr val="tx1">
-                    <a:lumMod val="75000"/>
-                    <a:lumOff val="25000"/>
-                  </a:schemeClr>
-                </a:solidFill>
-                <a:latin typeface="+mn-lt"/>
-                <a:ea typeface="+mn-ea"/>
-                <a:cs typeface="+mn-cs"/>
-              </a:defRPr>
-            </a:lvl4pPr>
-            <a:lvl5pPr marL="2057400" indent="-228600" algn="l" defTabSz="457200" rtl="0" eaLnBrk="1" latinLnBrk="0" hangingPunct="1">
-              <a:spcBef>
-                <a:spcPts val="1000"/>
-              </a:spcBef>
-              <a:spcAft>
-                <a:spcPts val="0"/>
-              </a:spcAft>
-              <a:buClr>
-                <a:schemeClr val="accent1"/>
-              </a:buClr>
-              <a:buSzPct val="80000"/>
-              <a:buFont typeface="Wingdings 3" charset="2"/>
-              <a:buChar char=""/>
-              <a:defRPr sz="1200" kern="1200">
-                <a:solidFill>
-                  <a:schemeClr val="tx1">
-                    <a:lumMod val="75000"/>
-                    <a:lumOff val="25000"/>
-                  </a:schemeClr>
-                </a:solidFill>
-                <a:latin typeface="+mn-lt"/>
-                <a:ea typeface="+mn-ea"/>
-                <a:cs typeface="+mn-cs"/>
-              </a:defRPr>
-            </a:lvl5pPr>
-            <a:lvl6pPr marL="2514600" indent="-228600" algn="l" defTabSz="457200" rtl="0" eaLnBrk="1" latinLnBrk="0" hangingPunct="1">
-              <a:spcBef>
-                <a:spcPts val="1000"/>
-              </a:spcBef>
-              <a:spcAft>
-                <a:spcPts val="0"/>
-              </a:spcAft>
-              <a:buClr>
-                <a:schemeClr val="accent1"/>
-              </a:buClr>
-              <a:buSzPct val="80000"/>
-              <a:buFont typeface="Wingdings 3" charset="2"/>
-              <a:buChar char=""/>
-              <a:defRPr sz="1200" kern="1200">
-                <a:solidFill>
-                  <a:schemeClr val="tx1">
-                    <a:lumMod val="75000"/>
-                    <a:lumOff val="25000"/>
-                  </a:schemeClr>
-                </a:solidFill>
-                <a:latin typeface="+mn-lt"/>
-                <a:ea typeface="+mn-ea"/>
-                <a:cs typeface="+mn-cs"/>
-              </a:defRPr>
-            </a:lvl6pPr>
-            <a:lvl7pPr marL="2971800" indent="-228600" algn="l" defTabSz="457200" rtl="0" eaLnBrk="1" latinLnBrk="0" hangingPunct="1">
-              <a:spcBef>
-                <a:spcPts val="1000"/>
-              </a:spcBef>
-              <a:spcAft>
-                <a:spcPts val="0"/>
-              </a:spcAft>
-              <a:buClr>
-                <a:schemeClr val="accent1"/>
-              </a:buClr>
-              <a:buSzPct val="80000"/>
-              <a:buFont typeface="Wingdings 3" charset="2"/>
-              <a:buChar char=""/>
-              <a:defRPr sz="1200" kern="1200">
-                <a:solidFill>
-                  <a:schemeClr val="tx1">
-                    <a:lumMod val="75000"/>
-                    <a:lumOff val="25000"/>
-                  </a:schemeClr>
-                </a:solidFill>
-                <a:latin typeface="+mn-lt"/>
-                <a:ea typeface="+mn-ea"/>
-                <a:cs typeface="+mn-cs"/>
-              </a:defRPr>
-            </a:lvl7pPr>
-            <a:lvl8pPr marL="3429000" indent="-228600" algn="l" defTabSz="457200" rtl="0" eaLnBrk="1" latinLnBrk="0" hangingPunct="1">
-              <a:spcBef>
-                <a:spcPts val="1000"/>
-              </a:spcBef>
-              <a:spcAft>
-                <a:spcPts val="0"/>
-              </a:spcAft>
-              <a:buClr>
-                <a:schemeClr val="accent1"/>
-              </a:buClr>
-              <a:buSzPct val="80000"/>
-              <a:buFont typeface="Wingdings 3" charset="2"/>
-              <a:buChar char=""/>
-              <a:defRPr sz="1200" kern="1200">
-                <a:solidFill>
-                  <a:schemeClr val="tx1">
-                    <a:lumMod val="75000"/>
-                    <a:lumOff val="25000"/>
-                  </a:schemeClr>
-                </a:solidFill>
-                <a:latin typeface="+mn-lt"/>
-                <a:ea typeface="+mn-ea"/>
-                <a:cs typeface="+mn-cs"/>
-              </a:defRPr>
-            </a:lvl8pPr>
-            <a:lvl9pPr marL="3886200" indent="-228600" algn="l" defTabSz="457200" rtl="0" eaLnBrk="1" latinLnBrk="0" hangingPunct="1">
-              <a:spcBef>
-                <a:spcPts val="1000"/>
-              </a:spcBef>
-              <a:spcAft>
-                <a:spcPts val="0"/>
-              </a:spcAft>
-              <a:buClr>
-                <a:schemeClr val="accent1"/>
-              </a:buClr>
-              <a:buSzPct val="80000"/>
-              <a:buFont typeface="Wingdings 3" charset="2"/>
-              <a:buChar char=""/>
-              <a:defRPr sz="1200" kern="1200">
-                <a:solidFill>
-                  <a:schemeClr val="tx1">
-                    <a:lumMod val="75000"/>
-                    <a:lumOff val="25000"/>
-                  </a:schemeClr>
-                </a:solidFill>
-                <a:latin typeface="+mn-lt"/>
-                <a:ea typeface="+mn-ea"/>
-                <a:cs typeface="+mn-cs"/>
-              </a:defRPr>
-            </a:lvl9pPr>
-          </a:lstStyle>
-          <a:p>
-            <a:pPr marL="0" indent="0">
-              <a:buNone/>
-            </a:pPr>
-            <a:r>
-              <a:rPr lang="en-US" b="1" dirty="0"/>
-              <a:t>Back-End Sub-Team</a:t>
-            </a:r>
-          </a:p>
-          <a:p>
-            <a:r>
-              <a:rPr lang="en-US" sz="1600" dirty="0"/>
-              <a:t>He</a:t>
-            </a:r>
-          </a:p>
-          <a:p>
-            <a:r>
-              <a:rPr lang="en-US" sz="1600" dirty="0"/>
-              <a:t>lo</a:t>
-            </a:r>
-          </a:p>
-        </p:txBody>
-      </p:sp>
-      <p:sp>
-        <p:nvSpPr>
-          <p:cNvPr id="13" name="Content Placeholder 2">
-            <a:extLst>
-              <a:ext uri="{FF2B5EF4-FFF2-40B4-BE49-F238E27FC236}">
-                <a16:creationId xmlns:a16="http://schemas.microsoft.com/office/drawing/2014/main" id="{DA9C3D7C-0DA3-9141-BEC8-7FC4600A4370}"/>
-              </a:ext>
-            </a:extLst>
-          </p:cNvPr>
-          <p:cNvSpPr txBox="1">
-            <a:spLocks/>
-          </p:cNvSpPr>
-          <p:nvPr/>
-        </p:nvSpPr>
-        <p:spPr>
-          <a:xfrm>
-            <a:off x="6236676" y="2177053"/>
-            <a:ext cx="3793589" cy="3880772"/>
-          </a:xfrm>
-          <a:prstGeom prst="rect">
-            <a:avLst/>
-          </a:prstGeom>
-        </p:spPr>
-        <p:txBody>
-          <a:bodyPr vert="horz" lIns="91440" tIns="45720" rIns="91440" bIns="45720" rtlCol="0">
-            <a:normAutofit/>
-          </a:bodyPr>
-          <a:lstStyle>
-            <a:lvl1pPr marL="342900" indent="-342900" algn="l" defTabSz="457200" rtl="0" eaLnBrk="1" latinLnBrk="0" hangingPunct="1">
-              <a:spcBef>
-                <a:spcPts val="1000"/>
-              </a:spcBef>
-              <a:spcAft>
-                <a:spcPts val="0"/>
-              </a:spcAft>
-              <a:buClr>
-                <a:schemeClr val="accent1"/>
-              </a:buClr>
-              <a:buSzPct val="80000"/>
-              <a:buFont typeface="Wingdings 3" charset="2"/>
-              <a:buChar char=""/>
-              <a:defRPr sz="1800" kern="1200">
-                <a:solidFill>
-                  <a:schemeClr val="tx1">
-                    <a:lumMod val="75000"/>
-                    <a:lumOff val="25000"/>
-                  </a:schemeClr>
-                </a:solidFill>
-                <a:latin typeface="+mn-lt"/>
-                <a:ea typeface="+mn-ea"/>
-                <a:cs typeface="+mn-cs"/>
-              </a:defRPr>
-            </a:lvl1pPr>
-            <a:lvl2pPr marL="742950" indent="-285750" algn="l" defTabSz="457200" rtl="0" eaLnBrk="1" latinLnBrk="0" hangingPunct="1">
-              <a:spcBef>
-                <a:spcPts val="1000"/>
-              </a:spcBef>
-              <a:spcAft>
-                <a:spcPts val="0"/>
-              </a:spcAft>
-              <a:buClr>
-                <a:schemeClr val="accent1"/>
-              </a:buClr>
-              <a:buSzPct val="80000"/>
-              <a:buFont typeface="Wingdings 3" charset="2"/>
-              <a:buChar char=""/>
-              <a:defRPr sz="1600" kern="1200">
-                <a:solidFill>
-                  <a:schemeClr val="tx1">
-                    <a:lumMod val="75000"/>
-                    <a:lumOff val="25000"/>
-                  </a:schemeClr>
-                </a:solidFill>
-                <a:latin typeface="+mn-lt"/>
-                <a:ea typeface="+mn-ea"/>
-                <a:cs typeface="+mn-cs"/>
-              </a:defRPr>
-            </a:lvl2pPr>
-            <a:lvl3pPr marL="1143000" indent="-228600" algn="l" defTabSz="457200" rtl="0" eaLnBrk="1" latinLnBrk="0" hangingPunct="1">
-              <a:spcBef>
-                <a:spcPts val="1000"/>
-              </a:spcBef>
-              <a:spcAft>
-                <a:spcPts val="0"/>
-              </a:spcAft>
-              <a:buClr>
-                <a:schemeClr val="accent1"/>
-              </a:buClr>
-              <a:buSzPct val="80000"/>
-              <a:buFont typeface="Wingdings 3" charset="2"/>
-              <a:buChar char=""/>
-              <a:defRPr sz="1400" kern="1200">
-                <a:solidFill>
-                  <a:schemeClr val="tx1">
-                    <a:lumMod val="75000"/>
-                    <a:lumOff val="25000"/>
-                  </a:schemeClr>
-                </a:solidFill>
-                <a:latin typeface="+mn-lt"/>
-                <a:ea typeface="+mn-ea"/>
-                <a:cs typeface="+mn-cs"/>
-              </a:defRPr>
-            </a:lvl3pPr>
-            <a:lvl4pPr marL="1600200" indent="-228600" algn="l" defTabSz="457200" rtl="0" eaLnBrk="1" latinLnBrk="0" hangingPunct="1">
-              <a:spcBef>
-                <a:spcPts val="1000"/>
-              </a:spcBef>
-              <a:spcAft>
-                <a:spcPts val="0"/>
-              </a:spcAft>
-              <a:buClr>
-                <a:schemeClr val="accent1"/>
-              </a:buClr>
-              <a:buSzPct val="80000"/>
-              <a:buFont typeface="Wingdings 3" charset="2"/>
-              <a:buChar char=""/>
-              <a:defRPr sz="1200" kern="1200">
-                <a:solidFill>
-                  <a:schemeClr val="tx1">
-                    <a:lumMod val="75000"/>
-                    <a:lumOff val="25000"/>
-                  </a:schemeClr>
-                </a:solidFill>
-                <a:latin typeface="+mn-lt"/>
-                <a:ea typeface="+mn-ea"/>
-                <a:cs typeface="+mn-cs"/>
-              </a:defRPr>
-            </a:lvl4pPr>
-            <a:lvl5pPr marL="2057400" indent="-228600" algn="l" defTabSz="457200" rtl="0" eaLnBrk="1" latinLnBrk="0" hangingPunct="1">
-              <a:spcBef>
-                <a:spcPts val="1000"/>
-              </a:spcBef>
-              <a:spcAft>
-                <a:spcPts val="0"/>
-              </a:spcAft>
-              <a:buClr>
-                <a:schemeClr val="accent1"/>
-              </a:buClr>
-              <a:buSzPct val="80000"/>
-              <a:buFont typeface="Wingdings 3" charset="2"/>
-              <a:buChar char=""/>
-              <a:defRPr sz="1200" kern="1200">
-                <a:solidFill>
-                  <a:schemeClr val="tx1">
-                    <a:lumMod val="75000"/>
-                    <a:lumOff val="25000"/>
-                  </a:schemeClr>
-                </a:solidFill>
-                <a:latin typeface="+mn-lt"/>
-                <a:ea typeface="+mn-ea"/>
-                <a:cs typeface="+mn-cs"/>
-              </a:defRPr>
-            </a:lvl5pPr>
-            <a:lvl6pPr marL="2514600" indent="-228600" algn="l" defTabSz="457200" rtl="0" eaLnBrk="1" latinLnBrk="0" hangingPunct="1">
-              <a:spcBef>
-                <a:spcPts val="1000"/>
-              </a:spcBef>
-              <a:spcAft>
-                <a:spcPts val="0"/>
-              </a:spcAft>
-              <a:buClr>
-                <a:schemeClr val="accent1"/>
-              </a:buClr>
-              <a:buSzPct val="80000"/>
-              <a:buFont typeface="Wingdings 3" charset="2"/>
-              <a:buChar char=""/>
-              <a:defRPr sz="1200" kern="1200">
-                <a:solidFill>
-                  <a:schemeClr val="tx1">
-                    <a:lumMod val="75000"/>
-                    <a:lumOff val="25000"/>
-                  </a:schemeClr>
-                </a:solidFill>
-                <a:latin typeface="+mn-lt"/>
-                <a:ea typeface="+mn-ea"/>
-                <a:cs typeface="+mn-cs"/>
-              </a:defRPr>
-            </a:lvl6pPr>
-            <a:lvl7pPr marL="2971800" indent="-228600" algn="l" defTabSz="457200" rtl="0" eaLnBrk="1" latinLnBrk="0" hangingPunct="1">
-              <a:spcBef>
-                <a:spcPts val="1000"/>
-              </a:spcBef>
-              <a:spcAft>
-                <a:spcPts val="0"/>
-              </a:spcAft>
-              <a:buClr>
-                <a:schemeClr val="accent1"/>
-              </a:buClr>
-              <a:buSzPct val="80000"/>
-              <a:buFont typeface="Wingdings 3" charset="2"/>
-              <a:buChar char=""/>
-              <a:defRPr sz="1200" kern="1200">
-                <a:solidFill>
-                  <a:schemeClr val="tx1">
-                    <a:lumMod val="75000"/>
-                    <a:lumOff val="25000"/>
-                  </a:schemeClr>
-                </a:solidFill>
-                <a:latin typeface="+mn-lt"/>
-                <a:ea typeface="+mn-ea"/>
-                <a:cs typeface="+mn-cs"/>
-              </a:defRPr>
-            </a:lvl7pPr>
-            <a:lvl8pPr marL="3429000" indent="-228600" algn="l" defTabSz="457200" rtl="0" eaLnBrk="1" latinLnBrk="0" hangingPunct="1">
-              <a:spcBef>
-                <a:spcPts val="1000"/>
-              </a:spcBef>
-              <a:spcAft>
-                <a:spcPts val="0"/>
-              </a:spcAft>
-              <a:buClr>
-                <a:schemeClr val="accent1"/>
-              </a:buClr>
-              <a:buSzPct val="80000"/>
-              <a:buFont typeface="Wingdings 3" charset="2"/>
-              <a:buChar char=""/>
-              <a:defRPr sz="1200" kern="1200">
-                <a:solidFill>
-                  <a:schemeClr val="tx1">
-                    <a:lumMod val="75000"/>
-                    <a:lumOff val="25000"/>
-                  </a:schemeClr>
-                </a:solidFill>
-                <a:latin typeface="+mn-lt"/>
-                <a:ea typeface="+mn-ea"/>
-                <a:cs typeface="+mn-cs"/>
-              </a:defRPr>
-            </a:lvl8pPr>
-            <a:lvl9pPr marL="3886200" indent="-228600" algn="l" defTabSz="457200" rtl="0" eaLnBrk="1" latinLnBrk="0" hangingPunct="1">
-              <a:spcBef>
-                <a:spcPts val="1000"/>
-              </a:spcBef>
-              <a:spcAft>
-                <a:spcPts val="0"/>
-              </a:spcAft>
-              <a:buClr>
-                <a:schemeClr val="accent1"/>
-              </a:buClr>
-              <a:buSzPct val="80000"/>
-              <a:buFont typeface="Wingdings 3" charset="2"/>
-              <a:buChar char=""/>
-              <a:defRPr sz="1200" kern="1200">
-                <a:solidFill>
-                  <a:schemeClr val="tx1">
-                    <a:lumMod val="75000"/>
-                    <a:lumOff val="25000"/>
-                  </a:schemeClr>
-                </a:solidFill>
-                <a:latin typeface="+mn-lt"/>
-                <a:ea typeface="+mn-ea"/>
-                <a:cs typeface="+mn-cs"/>
-              </a:defRPr>
-            </a:lvl9pPr>
-          </a:lstStyle>
-          <a:p>
-            <a:pPr marL="0" indent="0">
-              <a:buNone/>
-            </a:pPr>
-            <a:r>
-              <a:rPr lang="en-US" b="1" dirty="0"/>
-              <a:t>Game Functionality Sub-Team</a:t>
-            </a:r>
-          </a:p>
-          <a:p>
-            <a:r>
-              <a:rPr lang="en-US" sz="1600" dirty="0"/>
-              <a:t>Lack of clear outline around game logic</a:t>
-            </a:r>
-          </a:p>
-          <a:p>
-            <a:r>
-              <a:rPr lang="en-US" sz="1600" dirty="0"/>
-              <a:t>Developing model for stock simulation</a:t>
-            </a:r>
-          </a:p>
-          <a:p>
-            <a:r>
-              <a:rPr lang="en-US" sz="1600" dirty="0"/>
-              <a:t>Fine tuning stock simulation algorithm to return realistic results</a:t>
-            </a:r>
-          </a:p>
-          <a:p>
-            <a:endParaRPr lang="en-US" dirty="0"/>
-          </a:p>
-        </p:txBody>
-      </p:sp>
+      </p:pic>
     </p:spTree>
     <p:extLst>
       <p:ext uri="{BB962C8B-B14F-4D97-AF65-F5344CB8AC3E}">
-        <p14:creationId xmlns:p14="http://schemas.microsoft.com/office/powerpoint/2010/main" val="186295014"/>
+        <p14:creationId xmlns:p14="http://schemas.microsoft.com/office/powerpoint/2010/main" val="1736920621"/>
       </p:ext>
     </p:extLst>
   </p:cSld>
@@ -12113,7 +10884,7 @@
           <p:cNvPr id="2" name="Title 1">
             <a:extLst>
               <a:ext uri="{FF2B5EF4-FFF2-40B4-BE49-F238E27FC236}">
-                <a16:creationId xmlns:a16="http://schemas.microsoft.com/office/drawing/2014/main" id="{22C1C253-565C-FE40-80D7-B4AC4F44A2F6}"/>
+                <a16:creationId xmlns:a16="http://schemas.microsoft.com/office/drawing/2014/main" id="{0B8510EA-80A4-A142-8E01-B079CE29C39A}"/>
               </a:ext>
             </a:extLst>
           </p:cNvPr>
@@ -12131,17 +10902,17 @@
           <a:p>
             <a:r>
               <a:rPr lang="en-US" dirty="0"/>
-              <a:t>Library Usage</a:t>
-            </a:r>
-          </a:p>
-        </p:txBody>
-      </p:sp>
-      <p:sp>
-        <p:nvSpPr>
-          <p:cNvPr id="3" name="Content Placeholder 2">
+              <a:t>Work in Progress</a:t>
+            </a:r>
+          </a:p>
+        </p:txBody>
+      </p:sp>
+      <p:sp>
+        <p:nvSpPr>
+          <p:cNvPr id="4" name="Content Placeholder 2">
             <a:extLst>
               <a:ext uri="{FF2B5EF4-FFF2-40B4-BE49-F238E27FC236}">
-                <a16:creationId xmlns:a16="http://schemas.microsoft.com/office/drawing/2014/main" id="{50660145-C99A-6B4F-A208-31F6374E4A14}"/>
+                <a16:creationId xmlns:a16="http://schemas.microsoft.com/office/drawing/2014/main" id="{402E3166-D3FF-904F-B026-8092268B2346}"/>
               </a:ext>
             </a:extLst>
           </p:cNvPr>
@@ -12149,52 +10920,73 @@
             <a:spLocks noGrp="1"/>
           </p:cNvSpPr>
           <p:nvPr>
-            <p:ph idx="1"/>
-          </p:nvPr>
-        </p:nvSpPr>
-        <p:spPr/>
-        <p:txBody>
-          <a:bodyPr/>
+            <p:ph sz="half" idx="1"/>
+          </p:nvPr>
+        </p:nvSpPr>
+        <p:spPr>
+          <a:xfrm>
+            <a:off x="677334" y="2160589"/>
+            <a:ext cx="7784085" cy="3880772"/>
+          </a:xfrm>
+        </p:spPr>
+        <p:txBody>
+          <a:bodyPr>
+            <a:normAutofit/>
+          </a:bodyPr>
           <a:lstStyle/>
           <a:p>
             <a:r>
               <a:rPr lang="en-US" dirty="0"/>
-              <a:t>Qt library usage</a:t>
+              <a:t>Button functionality integration with game logic</a:t>
+            </a:r>
+          </a:p>
+          <a:p>
+            <a:r>
+              <a:rPr lang="en-US" dirty="0"/>
+              <a:t>Solidify game security</a:t>
+            </a:r>
+          </a:p>
+          <a:p>
+            <a:r>
+              <a:rPr lang="en-US" dirty="0"/>
+              <a:t>Implement new game logic for additional features</a:t>
             </a:r>
           </a:p>
           <a:p>
             <a:pPr lvl="1"/>
             <a:r>
               <a:rPr lang="en-US" dirty="0"/>
-              <a:t>Good libraries visually, but do not exist on many IDE’s</a:t>
+              <a:t>Buy out functionality</a:t>
             </a:r>
           </a:p>
           <a:p>
             <a:pPr lvl="1"/>
             <a:r>
               <a:rPr lang="en-US" dirty="0"/>
-              <a:t>Led to many team members needing to download Qt Creator IDE in order to run the program</a:t>
-            </a:r>
+              <a:t>Log out functionality</a:t>
+            </a:r>
+            <a:endParaRPr lang="en-US" sz="1800" dirty="0"/>
           </a:p>
           <a:p>
             <a:pPr lvl="1"/>
             <a:r>
               <a:rPr lang="en-US" dirty="0"/>
-              <a:t>IDE does not show errors well – difficulty debugging</a:t>
-            </a:r>
-          </a:p>
-          <a:p>
-            <a:pPr marL="457200" lvl="1" indent="0">
-              <a:buNone/>
-            </a:pPr>
-            <a:endParaRPr lang="en-US" dirty="0"/>
+              <a:t>Per round fee</a:t>
+            </a:r>
+          </a:p>
+          <a:p>
+            <a:pPr lvl="1"/>
+            <a:r>
+              <a:rPr lang="en-US" dirty="0"/>
+              <a:t>Chat box</a:t>
+            </a:r>
           </a:p>
         </p:txBody>
       </p:sp>
     </p:spTree>
     <p:extLst>
       <p:ext uri="{BB962C8B-B14F-4D97-AF65-F5344CB8AC3E}">
-        <p14:creationId xmlns:p14="http://schemas.microsoft.com/office/powerpoint/2010/main" val="1736920621"/>
+        <p14:creationId xmlns:p14="http://schemas.microsoft.com/office/powerpoint/2010/main" val="430596845"/>
       </p:ext>
     </p:extLst>
   </p:cSld>

</xml_diff>

<commit_message>
Fix Backend work distri
</commit_message>
<xml_diff>
--- a/docs/CMPE 320 Final Group Presentation.pptx
+++ b/docs/CMPE 320 Final Group Presentation.pptx
@@ -7913,15 +7913,7 @@
             </a:r>
             <a:r>
               <a:rPr lang="en-CA" dirty="0"/>
-              <a:t>commerce students and anyone with a desire to participate </a:t>
-            </a:r>
-            <a:r>
-              <a:rPr lang="en-CA"/>
-              <a:t>in an indie stock </a:t>
-            </a:r>
-            <a:r>
-              <a:rPr lang="en-CA" dirty="0"/>
-              <a:t>trading experience without being exposed to the risks involved with real trading</a:t>
+              <a:t>commerce students and anyone with a desire to participate in an indie stock trading experience without being exposed to the risks involved with real trading</a:t>
             </a:r>
             <a:endParaRPr lang="en-US" dirty="0"/>
           </a:p>
@@ -8763,18 +8755,6 @@
           <a:p>
             <a:r>
               <a:rPr lang="en-US" sz="1600" dirty="0"/>
-              <a:t>Server hosted on Linux</a:t>
-            </a:r>
-          </a:p>
-          <a:p>
-            <a:r>
-              <a:rPr lang="en-US" sz="1600" dirty="0"/>
-              <a:t>Clients hosted Windows systems </a:t>
-            </a:r>
-          </a:p>
-          <a:p>
-            <a:r>
-              <a:rPr lang="en-US" sz="1600" dirty="0"/>
               <a:t>Entire server-client relationship built on sockets</a:t>
             </a:r>
           </a:p>
@@ -8782,6 +8762,12 @@
             <a:r>
               <a:rPr lang="en-US" sz="1600" dirty="0"/>
               <a:t>Multithreading used for asynchronous sending/receiving for both clients and server</a:t>
+            </a:r>
+          </a:p>
+          <a:p>
+            <a:r>
+              <a:rPr lang="en-US" sz="1600" dirty="0"/>
+              <a:t>Server is hosted on Linux while clients are hosted Windows systems </a:t>
             </a:r>
           </a:p>
           <a:p>

</xml_diff>